<commit_message>
Second draft of deliverable 1
</commit_message>
<xml_diff>
--- a/Team Deliverable 1/ACA Risk Adjustment EHR Enhancement - FHIRed UP.pptx
+++ b/Team Deliverable 1/ACA Risk Adjustment EHR Enhancement - FHIRed UP.pptx
@@ -4,6 +4,9 @@
   <p:sldMasterIdLst>
     <p:sldMasterId id="2147483648" r:id="rId1"/>
   </p:sldMasterIdLst>
+  <p:notesMasterIdLst>
+    <p:notesMasterId r:id="rId9"/>
+  </p:notesMasterIdLst>
   <p:sldIdLst>
     <p:sldId id="256" r:id="rId2"/>
     <p:sldId id="257" r:id="rId3"/>
@@ -11,12 +14,7 @@
     <p:sldId id="259" r:id="rId5"/>
     <p:sldId id="260" r:id="rId6"/>
     <p:sldId id="267" r:id="rId7"/>
-    <p:sldId id="261" r:id="rId8"/>
-    <p:sldId id="262" r:id="rId9"/>
-    <p:sldId id="263" r:id="rId10"/>
-    <p:sldId id="264" r:id="rId11"/>
-    <p:sldId id="265" r:id="rId12"/>
-    <p:sldId id="266" r:id="rId13"/>
+    <p:sldId id="268" r:id="rId8"/>
   </p:sldIdLst>
   <p:sldSz cx="9144000" cy="6858000" type="screen4x3"/>
   <p:notesSz cx="6858000" cy="9144000"/>
@@ -115,7 +113,970 @@
       </a:defRPr>
     </a:lvl9pPr>
   </p:defaultTextStyle>
+  <p:extLst>
+    <p:ext uri="{EFAFB233-063F-42B5-8137-9DF3F51BA10A}">
+      <p15:sldGuideLst xmlns:p15="http://schemas.microsoft.com/office/powerpoint/2012/main">
+        <p15:guide id="1" orient="horz" pos="2160">
+          <p15:clr>
+            <a:srgbClr val="A4A3A4"/>
+          </p15:clr>
+        </p15:guide>
+        <p15:guide id="2" pos="2880">
+          <p15:clr>
+            <a:srgbClr val="A4A3A4"/>
+          </p15:clr>
+        </p15:guide>
+      </p15:sldGuideLst>
+    </p:ext>
+  </p:extLst>
 </p:presentation>
+</file>
+
+<file path=ppt/notesMasters/notesMaster1.xml><?xml version="1.0" encoding="utf-8"?>
+<p:notesMaster xmlns:a="http://schemas.openxmlformats.org/drawingml/2006/main" xmlns:r="http://schemas.openxmlformats.org/officeDocument/2006/relationships" xmlns:p="http://schemas.openxmlformats.org/presentationml/2006/main">
+  <p:cSld>
+    <p:bg>
+      <p:bgRef idx="1001">
+        <a:schemeClr val="bg1"/>
+      </p:bgRef>
+    </p:bg>
+    <p:spTree>
+      <p:nvGrpSpPr>
+        <p:cNvPr id="1" name=""/>
+        <p:cNvGrpSpPr/>
+        <p:nvPr/>
+      </p:nvGrpSpPr>
+      <p:grpSpPr>
+        <a:xfrm>
+          <a:off x="0" y="0"/>
+          <a:ext cx="0" cy="0"/>
+          <a:chOff x="0" y="0"/>
+          <a:chExt cx="0" cy="0"/>
+        </a:xfrm>
+      </p:grpSpPr>
+      <p:sp>
+        <p:nvSpPr>
+          <p:cNvPr id="2" name="Header Placeholder 1"/>
+          <p:cNvSpPr>
+            <a:spLocks noGrp="1"/>
+          </p:cNvSpPr>
+          <p:nvPr>
+            <p:ph type="hdr" sz="quarter"/>
+          </p:nvPr>
+        </p:nvSpPr>
+        <p:spPr>
+          <a:xfrm>
+            <a:off x="0" y="0"/>
+            <a:ext cx="2971800" cy="458788"/>
+          </a:xfrm>
+          <a:prstGeom prst="rect">
+            <a:avLst/>
+          </a:prstGeom>
+        </p:spPr>
+        <p:txBody>
+          <a:bodyPr vert="horz" lIns="91440" tIns="45720" rIns="91440" bIns="45720" rtlCol="0"/>
+          <a:lstStyle>
+            <a:lvl1pPr algn="l">
+              <a:defRPr sz="1200"/>
+            </a:lvl1pPr>
+          </a:lstStyle>
+          <a:p>
+            <a:endParaRPr lang="en-US"/>
+          </a:p>
+        </p:txBody>
+      </p:sp>
+      <p:sp>
+        <p:nvSpPr>
+          <p:cNvPr id="3" name="Date Placeholder 2"/>
+          <p:cNvSpPr>
+            <a:spLocks noGrp="1"/>
+          </p:cNvSpPr>
+          <p:nvPr>
+            <p:ph type="dt" idx="1"/>
+          </p:nvPr>
+        </p:nvSpPr>
+        <p:spPr>
+          <a:xfrm>
+            <a:off x="3884613" y="0"/>
+            <a:ext cx="2971800" cy="458788"/>
+          </a:xfrm>
+          <a:prstGeom prst="rect">
+            <a:avLst/>
+          </a:prstGeom>
+        </p:spPr>
+        <p:txBody>
+          <a:bodyPr vert="horz" lIns="91440" tIns="45720" rIns="91440" bIns="45720" rtlCol="0"/>
+          <a:lstStyle>
+            <a:lvl1pPr algn="r">
+              <a:defRPr sz="1200"/>
+            </a:lvl1pPr>
+          </a:lstStyle>
+          <a:p>
+            <a:fld id="{16779E05-0FD6-4556-BB9C-C73EB99D11FA}" type="datetimeFigureOut">
+              <a:rPr lang="en-US" smtClean="0"/>
+              <a:t>2/13/2016</a:t>
+            </a:fld>
+            <a:endParaRPr lang="en-US"/>
+          </a:p>
+        </p:txBody>
+      </p:sp>
+      <p:sp>
+        <p:nvSpPr>
+          <p:cNvPr id="4" name="Slide Image Placeholder 3"/>
+          <p:cNvSpPr>
+            <a:spLocks noGrp="1" noRot="1" noChangeAspect="1"/>
+          </p:cNvSpPr>
+          <p:nvPr>
+            <p:ph type="sldImg" idx="2"/>
+          </p:nvPr>
+        </p:nvSpPr>
+        <p:spPr>
+          <a:xfrm>
+            <a:off x="1371600" y="1143000"/>
+            <a:ext cx="4114800" cy="3086100"/>
+          </a:xfrm>
+          <a:prstGeom prst="rect">
+            <a:avLst/>
+          </a:prstGeom>
+          <a:noFill/>
+          <a:ln w="12700">
+            <a:solidFill>
+              <a:prstClr val="black"/>
+            </a:solidFill>
+          </a:ln>
+        </p:spPr>
+        <p:txBody>
+          <a:bodyPr vert="horz" lIns="91440" tIns="45720" rIns="91440" bIns="45720" rtlCol="0" anchor="ctr"/>
+          <a:lstStyle/>
+          <a:p>
+            <a:endParaRPr lang="en-US"/>
+          </a:p>
+        </p:txBody>
+      </p:sp>
+      <p:sp>
+        <p:nvSpPr>
+          <p:cNvPr id="5" name="Notes Placeholder 4"/>
+          <p:cNvSpPr>
+            <a:spLocks noGrp="1"/>
+          </p:cNvSpPr>
+          <p:nvPr>
+            <p:ph type="body" sz="quarter" idx="3"/>
+          </p:nvPr>
+        </p:nvSpPr>
+        <p:spPr>
+          <a:xfrm>
+            <a:off x="685800" y="4400550"/>
+            <a:ext cx="5486400" cy="3600450"/>
+          </a:xfrm>
+          <a:prstGeom prst="rect">
+            <a:avLst/>
+          </a:prstGeom>
+        </p:spPr>
+        <p:txBody>
+          <a:bodyPr vert="horz" lIns="91440" tIns="45720" rIns="91440" bIns="45720" rtlCol="0"/>
+          <a:lstStyle/>
+          <a:p>
+            <a:pPr lvl="0"/>
+            <a:r>
+              <a:rPr lang="en-US" smtClean="0"/>
+              <a:t>Edit Master text styles</a:t>
+            </a:r>
+          </a:p>
+          <a:p>
+            <a:pPr lvl="1"/>
+            <a:r>
+              <a:rPr lang="en-US" smtClean="0"/>
+              <a:t>Second level</a:t>
+            </a:r>
+          </a:p>
+          <a:p>
+            <a:pPr lvl="2"/>
+            <a:r>
+              <a:rPr lang="en-US" smtClean="0"/>
+              <a:t>Third level</a:t>
+            </a:r>
+          </a:p>
+          <a:p>
+            <a:pPr lvl="3"/>
+            <a:r>
+              <a:rPr lang="en-US" smtClean="0"/>
+              <a:t>Fourth level</a:t>
+            </a:r>
+          </a:p>
+          <a:p>
+            <a:pPr lvl="4"/>
+            <a:r>
+              <a:rPr lang="en-US" smtClean="0"/>
+              <a:t>Fifth level</a:t>
+            </a:r>
+            <a:endParaRPr lang="en-US"/>
+          </a:p>
+        </p:txBody>
+      </p:sp>
+      <p:sp>
+        <p:nvSpPr>
+          <p:cNvPr id="6" name="Footer Placeholder 5"/>
+          <p:cNvSpPr>
+            <a:spLocks noGrp="1"/>
+          </p:cNvSpPr>
+          <p:nvPr>
+            <p:ph type="ftr" sz="quarter" idx="4"/>
+          </p:nvPr>
+        </p:nvSpPr>
+        <p:spPr>
+          <a:xfrm>
+            <a:off x="0" y="8685213"/>
+            <a:ext cx="2971800" cy="458787"/>
+          </a:xfrm>
+          <a:prstGeom prst="rect">
+            <a:avLst/>
+          </a:prstGeom>
+        </p:spPr>
+        <p:txBody>
+          <a:bodyPr vert="horz" lIns="91440" tIns="45720" rIns="91440" bIns="45720" rtlCol="0" anchor="b"/>
+          <a:lstStyle>
+            <a:lvl1pPr algn="l">
+              <a:defRPr sz="1200"/>
+            </a:lvl1pPr>
+          </a:lstStyle>
+          <a:p>
+            <a:endParaRPr lang="en-US"/>
+          </a:p>
+        </p:txBody>
+      </p:sp>
+      <p:sp>
+        <p:nvSpPr>
+          <p:cNvPr id="7" name="Slide Number Placeholder 6"/>
+          <p:cNvSpPr>
+            <a:spLocks noGrp="1"/>
+          </p:cNvSpPr>
+          <p:nvPr>
+            <p:ph type="sldNum" sz="quarter" idx="5"/>
+          </p:nvPr>
+        </p:nvSpPr>
+        <p:spPr>
+          <a:xfrm>
+            <a:off x="3884613" y="8685213"/>
+            <a:ext cx="2971800" cy="458787"/>
+          </a:xfrm>
+          <a:prstGeom prst="rect">
+            <a:avLst/>
+          </a:prstGeom>
+        </p:spPr>
+        <p:txBody>
+          <a:bodyPr vert="horz" lIns="91440" tIns="45720" rIns="91440" bIns="45720" rtlCol="0" anchor="b"/>
+          <a:lstStyle>
+            <a:lvl1pPr algn="r">
+              <a:defRPr sz="1200"/>
+            </a:lvl1pPr>
+          </a:lstStyle>
+          <a:p>
+            <a:fld id="{A324EC77-1E53-42B7-AFE1-8E594C8CCE79}" type="slidenum">
+              <a:rPr lang="en-US" smtClean="0"/>
+              <a:t>‹#›</a:t>
+            </a:fld>
+            <a:endParaRPr lang="en-US"/>
+          </a:p>
+        </p:txBody>
+      </p:sp>
+    </p:spTree>
+    <p:extLst>
+      <p:ext uri="{BB962C8B-B14F-4D97-AF65-F5344CB8AC3E}">
+        <p14:creationId xmlns:p14="http://schemas.microsoft.com/office/powerpoint/2010/main" val="1775660700"/>
+      </p:ext>
+    </p:extLst>
+  </p:cSld>
+  <p:clrMap bg1="lt1" tx1="dk1" bg2="lt2" tx2="dk2" accent1="accent1" accent2="accent2" accent3="accent3" accent4="accent4" accent5="accent5" accent6="accent6" hlink="hlink" folHlink="folHlink"/>
+  <p:notesStyle>
+    <a:lvl1pPr marL="0" algn="l" defTabSz="914400" rtl="0" eaLnBrk="1" latinLnBrk="0" hangingPunct="1">
+      <a:defRPr sz="1200" kern="1200">
+        <a:solidFill>
+          <a:schemeClr val="tx1"/>
+        </a:solidFill>
+        <a:latin typeface="+mn-lt"/>
+        <a:ea typeface="+mn-ea"/>
+        <a:cs typeface="+mn-cs"/>
+      </a:defRPr>
+    </a:lvl1pPr>
+    <a:lvl2pPr marL="457200" algn="l" defTabSz="914400" rtl="0" eaLnBrk="1" latinLnBrk="0" hangingPunct="1">
+      <a:defRPr sz="1200" kern="1200">
+        <a:solidFill>
+          <a:schemeClr val="tx1"/>
+        </a:solidFill>
+        <a:latin typeface="+mn-lt"/>
+        <a:ea typeface="+mn-ea"/>
+        <a:cs typeface="+mn-cs"/>
+      </a:defRPr>
+    </a:lvl2pPr>
+    <a:lvl3pPr marL="914400" algn="l" defTabSz="914400" rtl="0" eaLnBrk="1" latinLnBrk="0" hangingPunct="1">
+      <a:defRPr sz="1200" kern="1200">
+        <a:solidFill>
+          <a:schemeClr val="tx1"/>
+        </a:solidFill>
+        <a:latin typeface="+mn-lt"/>
+        <a:ea typeface="+mn-ea"/>
+        <a:cs typeface="+mn-cs"/>
+      </a:defRPr>
+    </a:lvl3pPr>
+    <a:lvl4pPr marL="1371600" algn="l" defTabSz="914400" rtl="0" eaLnBrk="1" latinLnBrk="0" hangingPunct="1">
+      <a:defRPr sz="1200" kern="1200">
+        <a:solidFill>
+          <a:schemeClr val="tx1"/>
+        </a:solidFill>
+        <a:latin typeface="+mn-lt"/>
+        <a:ea typeface="+mn-ea"/>
+        <a:cs typeface="+mn-cs"/>
+      </a:defRPr>
+    </a:lvl4pPr>
+    <a:lvl5pPr marL="1828800" algn="l" defTabSz="914400" rtl="0" eaLnBrk="1" latinLnBrk="0" hangingPunct="1">
+      <a:defRPr sz="1200" kern="1200">
+        <a:solidFill>
+          <a:schemeClr val="tx1"/>
+        </a:solidFill>
+        <a:latin typeface="+mn-lt"/>
+        <a:ea typeface="+mn-ea"/>
+        <a:cs typeface="+mn-cs"/>
+      </a:defRPr>
+    </a:lvl5pPr>
+    <a:lvl6pPr marL="2286000" algn="l" defTabSz="914400" rtl="0" eaLnBrk="1" latinLnBrk="0" hangingPunct="1">
+      <a:defRPr sz="1200" kern="1200">
+        <a:solidFill>
+          <a:schemeClr val="tx1"/>
+        </a:solidFill>
+        <a:latin typeface="+mn-lt"/>
+        <a:ea typeface="+mn-ea"/>
+        <a:cs typeface="+mn-cs"/>
+      </a:defRPr>
+    </a:lvl6pPr>
+    <a:lvl7pPr marL="2743200" algn="l" defTabSz="914400" rtl="0" eaLnBrk="1" latinLnBrk="0" hangingPunct="1">
+      <a:defRPr sz="1200" kern="1200">
+        <a:solidFill>
+          <a:schemeClr val="tx1"/>
+        </a:solidFill>
+        <a:latin typeface="+mn-lt"/>
+        <a:ea typeface="+mn-ea"/>
+        <a:cs typeface="+mn-cs"/>
+      </a:defRPr>
+    </a:lvl7pPr>
+    <a:lvl8pPr marL="3200400" algn="l" defTabSz="914400" rtl="0" eaLnBrk="1" latinLnBrk="0" hangingPunct="1">
+      <a:defRPr sz="1200" kern="1200">
+        <a:solidFill>
+          <a:schemeClr val="tx1"/>
+        </a:solidFill>
+        <a:latin typeface="+mn-lt"/>
+        <a:ea typeface="+mn-ea"/>
+        <a:cs typeface="+mn-cs"/>
+      </a:defRPr>
+    </a:lvl8pPr>
+    <a:lvl9pPr marL="3657600" algn="l" defTabSz="914400" rtl="0" eaLnBrk="1" latinLnBrk="0" hangingPunct="1">
+      <a:defRPr sz="1200" kern="1200">
+        <a:solidFill>
+          <a:schemeClr val="tx1"/>
+        </a:solidFill>
+        <a:latin typeface="+mn-lt"/>
+        <a:ea typeface="+mn-ea"/>
+        <a:cs typeface="+mn-cs"/>
+      </a:defRPr>
+    </a:lvl9pPr>
+  </p:notesStyle>
+</p:notesMaster>
+</file>
+
+<file path=ppt/notesSlides/notesSlide1.xml><?xml version="1.0" encoding="utf-8"?>
+<p:notes xmlns:a="http://schemas.openxmlformats.org/drawingml/2006/main" xmlns:r="http://schemas.openxmlformats.org/officeDocument/2006/relationships" xmlns:p="http://schemas.openxmlformats.org/presentationml/2006/main">
+  <p:cSld>
+    <p:spTree>
+      <p:nvGrpSpPr>
+        <p:cNvPr id="1" name=""/>
+        <p:cNvGrpSpPr/>
+        <p:nvPr/>
+      </p:nvGrpSpPr>
+      <p:grpSpPr>
+        <a:xfrm>
+          <a:off x="0" y="0"/>
+          <a:ext cx="0" cy="0"/>
+          <a:chOff x="0" y="0"/>
+          <a:chExt cx="0" cy="0"/>
+        </a:xfrm>
+      </p:grpSpPr>
+      <p:sp>
+        <p:nvSpPr>
+          <p:cNvPr id="2" name="Slide Image Placeholder 1"/>
+          <p:cNvSpPr>
+            <a:spLocks noGrp="1" noRot="1" noChangeAspect="1"/>
+          </p:cNvSpPr>
+          <p:nvPr>
+            <p:ph type="sldImg"/>
+          </p:nvPr>
+        </p:nvSpPr>
+        <p:spPr/>
+      </p:sp>
+      <p:sp>
+        <p:nvSpPr>
+          <p:cNvPr id="3" name="Notes Placeholder 2"/>
+          <p:cNvSpPr>
+            <a:spLocks noGrp="1"/>
+          </p:cNvSpPr>
+          <p:nvPr>
+            <p:ph type="body" idx="1"/>
+          </p:nvPr>
+        </p:nvSpPr>
+        <p:spPr/>
+        <p:txBody>
+          <a:bodyPr/>
+          <a:lstStyle/>
+          <a:p>
+            <a:r>
+              <a:rPr lang="en-US" sz="1200" kern="1200" dirty="0" smtClean="0">
+                <a:solidFill>
+                  <a:schemeClr val="tx1"/>
+                </a:solidFill>
+                <a:effectLst/>
+                <a:latin typeface="+mn-lt"/>
+                <a:ea typeface="+mn-ea"/>
+                <a:cs typeface="+mn-cs"/>
+              </a:rPr>
+              <a:t>The </a:t>
+            </a:r>
+            <a:r>
+              <a:rPr lang="en-US" sz="1200" kern="1200" dirty="0" err="1" smtClean="0">
+                <a:solidFill>
+                  <a:schemeClr val="tx1"/>
+                </a:solidFill>
+                <a:effectLst/>
+                <a:latin typeface="+mn-lt"/>
+                <a:ea typeface="+mn-ea"/>
+                <a:cs typeface="+mn-cs"/>
+              </a:rPr>
+              <a:t>FHIRed</a:t>
+            </a:r>
+            <a:r>
+              <a:rPr lang="en-US" sz="1200" kern="1200" dirty="0" smtClean="0">
+                <a:solidFill>
+                  <a:schemeClr val="tx1"/>
+                </a:solidFill>
+                <a:effectLst/>
+                <a:latin typeface="+mn-lt"/>
+                <a:ea typeface="+mn-ea"/>
+                <a:cs typeface="+mn-cs"/>
+              </a:rPr>
+              <a:t> Up Team is developing an electronic health record data validation tool.  This tool will help providers verify a patient’s current list of diagnoses.  Accurate diagnosis data will insure that providers and health insurance companies are fairly compensated under the accountable care act’s risk adjustment program.</a:t>
+            </a:r>
+            <a:endParaRPr lang="en-US" dirty="0"/>
+          </a:p>
+        </p:txBody>
+      </p:sp>
+      <p:sp>
+        <p:nvSpPr>
+          <p:cNvPr id="4" name="Slide Number Placeholder 3"/>
+          <p:cNvSpPr>
+            <a:spLocks noGrp="1"/>
+          </p:cNvSpPr>
+          <p:nvPr>
+            <p:ph type="sldNum" sz="quarter" idx="10"/>
+          </p:nvPr>
+        </p:nvSpPr>
+        <p:spPr/>
+        <p:txBody>
+          <a:bodyPr/>
+          <a:lstStyle/>
+          <a:p>
+            <a:fld id="{A324EC77-1E53-42B7-AFE1-8E594C8CCE79}" type="slidenum">
+              <a:rPr lang="en-US" smtClean="0"/>
+              <a:t>1</a:t>
+            </a:fld>
+            <a:endParaRPr lang="en-US"/>
+          </a:p>
+        </p:txBody>
+      </p:sp>
+    </p:spTree>
+    <p:extLst>
+      <p:ext uri="{BB962C8B-B14F-4D97-AF65-F5344CB8AC3E}">
+        <p14:creationId xmlns:p14="http://schemas.microsoft.com/office/powerpoint/2010/main" val="3449944843"/>
+      </p:ext>
+    </p:extLst>
+  </p:cSld>
+  <p:clrMapOvr>
+    <a:masterClrMapping/>
+  </p:clrMapOvr>
+</p:notes>
+</file>
+
+<file path=ppt/notesSlides/notesSlide2.xml><?xml version="1.0" encoding="utf-8"?>
+<p:notes xmlns:a="http://schemas.openxmlformats.org/drawingml/2006/main" xmlns:r="http://schemas.openxmlformats.org/officeDocument/2006/relationships" xmlns:p="http://schemas.openxmlformats.org/presentationml/2006/main">
+  <p:cSld>
+    <p:spTree>
+      <p:nvGrpSpPr>
+        <p:cNvPr id="1" name=""/>
+        <p:cNvGrpSpPr/>
+        <p:nvPr/>
+      </p:nvGrpSpPr>
+      <p:grpSpPr>
+        <a:xfrm>
+          <a:off x="0" y="0"/>
+          <a:ext cx="0" cy="0"/>
+          <a:chOff x="0" y="0"/>
+          <a:chExt cx="0" cy="0"/>
+        </a:xfrm>
+      </p:grpSpPr>
+      <p:sp>
+        <p:nvSpPr>
+          <p:cNvPr id="2" name="Slide Image Placeholder 1"/>
+          <p:cNvSpPr>
+            <a:spLocks noGrp="1" noRot="1" noChangeAspect="1"/>
+          </p:cNvSpPr>
+          <p:nvPr>
+            <p:ph type="sldImg"/>
+          </p:nvPr>
+        </p:nvSpPr>
+        <p:spPr/>
+      </p:sp>
+      <p:sp>
+        <p:nvSpPr>
+          <p:cNvPr id="3" name="Notes Placeholder 2"/>
+          <p:cNvSpPr>
+            <a:spLocks noGrp="1"/>
+          </p:cNvSpPr>
+          <p:nvPr>
+            <p:ph type="body" idx="1"/>
+          </p:nvPr>
+        </p:nvSpPr>
+        <p:spPr/>
+        <p:txBody>
+          <a:bodyPr/>
+          <a:lstStyle/>
+          <a:p>
+            <a:r>
+              <a:rPr lang="en-US" dirty="0" smtClean="0"/>
+              <a:t>The Accountable Care Act requires health insurance</a:t>
+            </a:r>
+            <a:r>
+              <a:rPr lang="en-US" baseline="0" dirty="0" smtClean="0"/>
+              <a:t> companies to offer insurance to people with pre-existing conditions.  By only offering policies with high co-pays and high-deductibles, insurance companies can discourage ill patients from purchasing their products.  Risk adjustment reduces to incentive to risk select by transferring premiums from insurers with healthy members to those insurers who are carting for a more ill population.</a:t>
+            </a:r>
+          </a:p>
+        </p:txBody>
+      </p:sp>
+      <p:sp>
+        <p:nvSpPr>
+          <p:cNvPr id="4" name="Slide Number Placeholder 3"/>
+          <p:cNvSpPr>
+            <a:spLocks noGrp="1"/>
+          </p:cNvSpPr>
+          <p:nvPr>
+            <p:ph type="sldNum" sz="quarter" idx="10"/>
+          </p:nvPr>
+        </p:nvSpPr>
+        <p:spPr/>
+        <p:txBody>
+          <a:bodyPr/>
+          <a:lstStyle/>
+          <a:p>
+            <a:fld id="{A324EC77-1E53-42B7-AFE1-8E594C8CCE79}" type="slidenum">
+              <a:rPr lang="en-US" smtClean="0"/>
+              <a:t>2</a:t>
+            </a:fld>
+            <a:endParaRPr lang="en-US"/>
+          </a:p>
+        </p:txBody>
+      </p:sp>
+    </p:spTree>
+    <p:extLst>
+      <p:ext uri="{BB962C8B-B14F-4D97-AF65-F5344CB8AC3E}">
+        <p14:creationId xmlns:p14="http://schemas.microsoft.com/office/powerpoint/2010/main" val="2402655612"/>
+      </p:ext>
+    </p:extLst>
+  </p:cSld>
+  <p:clrMapOvr>
+    <a:masterClrMapping/>
+  </p:clrMapOvr>
+</p:notes>
+</file>
+
+<file path=ppt/notesSlides/notesSlide3.xml><?xml version="1.0" encoding="utf-8"?>
+<p:notes xmlns:a="http://schemas.openxmlformats.org/drawingml/2006/main" xmlns:r="http://schemas.openxmlformats.org/officeDocument/2006/relationships" xmlns:p="http://schemas.openxmlformats.org/presentationml/2006/main">
+  <p:cSld>
+    <p:spTree>
+      <p:nvGrpSpPr>
+        <p:cNvPr id="1" name=""/>
+        <p:cNvGrpSpPr/>
+        <p:nvPr/>
+      </p:nvGrpSpPr>
+      <p:grpSpPr>
+        <a:xfrm>
+          <a:off x="0" y="0"/>
+          <a:ext cx="0" cy="0"/>
+          <a:chOff x="0" y="0"/>
+          <a:chExt cx="0" cy="0"/>
+        </a:xfrm>
+      </p:grpSpPr>
+      <p:sp>
+        <p:nvSpPr>
+          <p:cNvPr id="2" name="Slide Image Placeholder 1"/>
+          <p:cNvSpPr>
+            <a:spLocks noGrp="1" noRot="1" noChangeAspect="1"/>
+          </p:cNvSpPr>
+          <p:nvPr>
+            <p:ph type="sldImg"/>
+          </p:nvPr>
+        </p:nvSpPr>
+        <p:spPr/>
+      </p:sp>
+      <p:sp>
+        <p:nvSpPr>
+          <p:cNvPr id="3" name="Notes Placeholder 2"/>
+          <p:cNvSpPr>
+            <a:spLocks noGrp="1"/>
+          </p:cNvSpPr>
+          <p:nvPr>
+            <p:ph type="body" idx="1"/>
+          </p:nvPr>
+        </p:nvSpPr>
+        <p:spPr/>
+        <p:txBody>
+          <a:bodyPr/>
+          <a:lstStyle/>
+          <a:p>
+            <a:r>
+              <a:rPr lang="en-US" dirty="0" smtClean="0"/>
+              <a:t>Risk</a:t>
+            </a:r>
+            <a:r>
+              <a:rPr lang="en-US" baseline="0" dirty="0" smtClean="0"/>
+              <a:t> scores are use to determine the average level of illness in an insurers population.  A diabetic with heart failure will have a risk score substantially higher than someone without any chronic conditions.  While several factors are used in the risk score calculation,  a patient’s recent diagnosis history is the most heavily-weighed factor.</a:t>
+            </a:r>
+            <a:endParaRPr lang="en-US" dirty="0"/>
+          </a:p>
+        </p:txBody>
+      </p:sp>
+      <p:sp>
+        <p:nvSpPr>
+          <p:cNvPr id="4" name="Slide Number Placeholder 3"/>
+          <p:cNvSpPr>
+            <a:spLocks noGrp="1"/>
+          </p:cNvSpPr>
+          <p:nvPr>
+            <p:ph type="sldNum" sz="quarter" idx="10"/>
+          </p:nvPr>
+        </p:nvSpPr>
+        <p:spPr/>
+        <p:txBody>
+          <a:bodyPr/>
+          <a:lstStyle/>
+          <a:p>
+            <a:fld id="{A324EC77-1E53-42B7-AFE1-8E594C8CCE79}" type="slidenum">
+              <a:rPr lang="en-US" smtClean="0"/>
+              <a:t>3</a:t>
+            </a:fld>
+            <a:endParaRPr lang="en-US"/>
+          </a:p>
+        </p:txBody>
+      </p:sp>
+    </p:spTree>
+    <p:extLst>
+      <p:ext uri="{BB962C8B-B14F-4D97-AF65-F5344CB8AC3E}">
+        <p14:creationId xmlns:p14="http://schemas.microsoft.com/office/powerpoint/2010/main" val="2145164489"/>
+      </p:ext>
+    </p:extLst>
+  </p:cSld>
+  <p:clrMapOvr>
+    <a:masterClrMapping/>
+  </p:clrMapOvr>
+</p:notes>
+</file>
+
+<file path=ppt/notesSlides/notesSlide4.xml><?xml version="1.0" encoding="utf-8"?>
+<p:notes xmlns:a="http://schemas.openxmlformats.org/drawingml/2006/main" xmlns:r="http://schemas.openxmlformats.org/officeDocument/2006/relationships" xmlns:p="http://schemas.openxmlformats.org/presentationml/2006/main">
+  <p:cSld>
+    <p:spTree>
+      <p:nvGrpSpPr>
+        <p:cNvPr id="1" name=""/>
+        <p:cNvGrpSpPr/>
+        <p:nvPr/>
+      </p:nvGrpSpPr>
+      <p:grpSpPr>
+        <a:xfrm>
+          <a:off x="0" y="0"/>
+          <a:ext cx="0" cy="0"/>
+          <a:chOff x="0" y="0"/>
+          <a:chExt cx="0" cy="0"/>
+        </a:xfrm>
+      </p:grpSpPr>
+      <p:sp>
+        <p:nvSpPr>
+          <p:cNvPr id="2" name="Slide Image Placeholder 1"/>
+          <p:cNvSpPr>
+            <a:spLocks noGrp="1" noRot="1" noChangeAspect="1"/>
+          </p:cNvSpPr>
+          <p:nvPr>
+            <p:ph type="sldImg"/>
+          </p:nvPr>
+        </p:nvSpPr>
+        <p:spPr/>
+      </p:sp>
+      <p:sp>
+        <p:nvSpPr>
+          <p:cNvPr id="3" name="Notes Placeholder 2"/>
+          <p:cNvSpPr>
+            <a:spLocks noGrp="1"/>
+          </p:cNvSpPr>
+          <p:nvPr>
+            <p:ph type="body" idx="1"/>
+          </p:nvPr>
+        </p:nvSpPr>
+        <p:spPr/>
+        <p:txBody>
+          <a:bodyPr/>
+          <a:lstStyle/>
+          <a:p>
+            <a:r>
+              <a:rPr lang="en-US" dirty="0" smtClean="0"/>
+              <a:t>In 2015, 61</a:t>
+            </a:r>
+            <a:r>
+              <a:rPr lang="en-US" baseline="0" dirty="0" smtClean="0"/>
+              <a:t> million dollars of premium was transferred between Massachusetts insurance companies.  Blue Cross, the states largest health insurance organization, received a 51 million dollars payment.  Many smaller insurance companies argued that better data quality, rather than a sicker population, contributed to this large transfer of fund to blue cross.  Fallon Health, a small insurance company that paid 11 million dollars, is an example of a company that has a strong interest in better data quality.</a:t>
+            </a:r>
+          </a:p>
+          <a:p>
+            <a:endParaRPr lang="en-US" baseline="0" dirty="0" smtClean="0"/>
+          </a:p>
+          <a:p>
+            <a:endParaRPr lang="en-US" baseline="0" dirty="0" smtClean="0"/>
+          </a:p>
+          <a:p>
+            <a:r>
+              <a:rPr lang="en-US" baseline="0" dirty="0" smtClean="0"/>
+              <a:t>Source:  http://www.masslive.com/news/index.ssf/2015/07/health_new_englands_26_million_risk_adjustment_fee_less_than_expected.html</a:t>
+            </a:r>
+          </a:p>
+          <a:p>
+            <a:endParaRPr lang="en-US" dirty="0"/>
+          </a:p>
+        </p:txBody>
+      </p:sp>
+      <p:sp>
+        <p:nvSpPr>
+          <p:cNvPr id="4" name="Slide Number Placeholder 3"/>
+          <p:cNvSpPr>
+            <a:spLocks noGrp="1"/>
+          </p:cNvSpPr>
+          <p:nvPr>
+            <p:ph type="sldNum" sz="quarter" idx="10"/>
+          </p:nvPr>
+        </p:nvSpPr>
+        <p:spPr/>
+        <p:txBody>
+          <a:bodyPr/>
+          <a:lstStyle/>
+          <a:p>
+            <a:fld id="{A324EC77-1E53-42B7-AFE1-8E594C8CCE79}" type="slidenum">
+              <a:rPr lang="en-US" smtClean="0"/>
+              <a:t>4</a:t>
+            </a:fld>
+            <a:endParaRPr lang="en-US"/>
+          </a:p>
+        </p:txBody>
+      </p:sp>
+    </p:spTree>
+    <p:extLst>
+      <p:ext uri="{BB962C8B-B14F-4D97-AF65-F5344CB8AC3E}">
+        <p14:creationId xmlns:p14="http://schemas.microsoft.com/office/powerpoint/2010/main" val="2689608386"/>
+      </p:ext>
+    </p:extLst>
+  </p:cSld>
+  <p:clrMapOvr>
+    <a:masterClrMapping/>
+  </p:clrMapOvr>
+</p:notes>
+</file>
+
+<file path=ppt/notesSlides/notesSlide5.xml><?xml version="1.0" encoding="utf-8"?>
+<p:notes xmlns:a="http://schemas.openxmlformats.org/drawingml/2006/main" xmlns:r="http://schemas.openxmlformats.org/officeDocument/2006/relationships" xmlns:p="http://schemas.openxmlformats.org/presentationml/2006/main">
+  <p:cSld>
+    <p:spTree>
+      <p:nvGrpSpPr>
+        <p:cNvPr id="1" name=""/>
+        <p:cNvGrpSpPr/>
+        <p:nvPr/>
+      </p:nvGrpSpPr>
+      <p:grpSpPr>
+        <a:xfrm>
+          <a:off x="0" y="0"/>
+          <a:ext cx="0" cy="0"/>
+          <a:chOff x="0" y="0"/>
+          <a:chExt cx="0" cy="0"/>
+        </a:xfrm>
+      </p:grpSpPr>
+      <p:sp>
+        <p:nvSpPr>
+          <p:cNvPr id="2" name="Slide Image Placeholder 1"/>
+          <p:cNvSpPr>
+            <a:spLocks noGrp="1" noRot="1" noChangeAspect="1"/>
+          </p:cNvSpPr>
+          <p:nvPr>
+            <p:ph type="sldImg"/>
+          </p:nvPr>
+        </p:nvSpPr>
+        <p:spPr/>
+      </p:sp>
+      <p:sp>
+        <p:nvSpPr>
+          <p:cNvPr id="3" name="Notes Placeholder 2"/>
+          <p:cNvSpPr>
+            <a:spLocks noGrp="1"/>
+          </p:cNvSpPr>
+          <p:nvPr>
+            <p:ph type="body" idx="1"/>
+          </p:nvPr>
+        </p:nvSpPr>
+        <p:spPr/>
+        <p:txBody>
+          <a:bodyPr/>
+          <a:lstStyle/>
+          <a:p>
+            <a:r>
+              <a:rPr lang="en-US" dirty="0" smtClean="0"/>
+              <a:t>Our tool will help verify that all of a patient’s chronic illnesses have been</a:t>
+            </a:r>
+            <a:r>
+              <a:rPr lang="en-US" baseline="0" dirty="0" smtClean="0"/>
+              <a:t> accurately recorded in the current calendar year.  We will use the FHIR interface to pull a member’s complete diagnosis history.  We will then group the ICD codes into categories.  Finally, we will identify chronic conditions that have not been reported in the current calendar year.</a:t>
+            </a:r>
+            <a:endParaRPr lang="en-US" dirty="0"/>
+          </a:p>
+        </p:txBody>
+      </p:sp>
+      <p:sp>
+        <p:nvSpPr>
+          <p:cNvPr id="4" name="Slide Number Placeholder 3"/>
+          <p:cNvSpPr>
+            <a:spLocks noGrp="1"/>
+          </p:cNvSpPr>
+          <p:nvPr>
+            <p:ph type="sldNum" sz="quarter" idx="10"/>
+          </p:nvPr>
+        </p:nvSpPr>
+        <p:spPr/>
+        <p:txBody>
+          <a:bodyPr/>
+          <a:lstStyle/>
+          <a:p>
+            <a:fld id="{A324EC77-1E53-42B7-AFE1-8E594C8CCE79}" type="slidenum">
+              <a:rPr lang="en-US" smtClean="0"/>
+              <a:t>5</a:t>
+            </a:fld>
+            <a:endParaRPr lang="en-US"/>
+          </a:p>
+        </p:txBody>
+      </p:sp>
+    </p:spTree>
+    <p:extLst>
+      <p:ext uri="{BB962C8B-B14F-4D97-AF65-F5344CB8AC3E}">
+        <p14:creationId xmlns:p14="http://schemas.microsoft.com/office/powerpoint/2010/main" val="393673576"/>
+      </p:ext>
+    </p:extLst>
+  </p:cSld>
+  <p:clrMapOvr>
+    <a:masterClrMapping/>
+  </p:clrMapOvr>
+</p:notes>
+</file>
+
+<file path=ppt/notesSlides/notesSlide6.xml><?xml version="1.0" encoding="utf-8"?>
+<p:notes xmlns:a="http://schemas.openxmlformats.org/drawingml/2006/main" xmlns:r="http://schemas.openxmlformats.org/officeDocument/2006/relationships" xmlns:p="http://schemas.openxmlformats.org/presentationml/2006/main">
+  <p:cSld>
+    <p:spTree>
+      <p:nvGrpSpPr>
+        <p:cNvPr id="1" name=""/>
+        <p:cNvGrpSpPr/>
+        <p:nvPr/>
+      </p:nvGrpSpPr>
+      <p:grpSpPr>
+        <a:xfrm>
+          <a:off x="0" y="0"/>
+          <a:ext cx="0" cy="0"/>
+          <a:chOff x="0" y="0"/>
+          <a:chExt cx="0" cy="0"/>
+        </a:xfrm>
+      </p:grpSpPr>
+      <p:sp>
+        <p:nvSpPr>
+          <p:cNvPr id="2" name="Slide Image Placeholder 1"/>
+          <p:cNvSpPr>
+            <a:spLocks noGrp="1" noRot="1" noChangeAspect="1"/>
+          </p:cNvSpPr>
+          <p:nvPr>
+            <p:ph type="sldImg"/>
+          </p:nvPr>
+        </p:nvSpPr>
+        <p:spPr/>
+      </p:sp>
+      <p:sp>
+        <p:nvSpPr>
+          <p:cNvPr id="3" name="Notes Placeholder 2"/>
+          <p:cNvSpPr>
+            <a:spLocks noGrp="1"/>
+          </p:cNvSpPr>
+          <p:nvPr>
+            <p:ph type="body" idx="1"/>
+          </p:nvPr>
+        </p:nvSpPr>
+        <p:spPr/>
+        <p:txBody>
+          <a:bodyPr/>
+          <a:lstStyle/>
+          <a:p>
+            <a:r>
+              <a:rPr lang="en-US" dirty="0" smtClean="0"/>
+              <a:t>This tool will identify patients with chronic conditions who have not visited their doctor during the current calendar year.  Insurance</a:t>
+            </a:r>
+            <a:r>
+              <a:rPr lang="en-US" baseline="0" dirty="0" smtClean="0"/>
+              <a:t> companies can use that data to send reminders to those patients.  It will also identify medical records that need to be reviewed by medical coding specialists.  We believe these two activities can substantially improve an insurance company’s overall risk score. </a:t>
+            </a:r>
+            <a:r>
+              <a:rPr lang="en-US" baseline="0" dirty="0" smtClean="0"/>
+              <a:t>  These activities will also improve the quality of the data stored in the electronic health records.</a:t>
+            </a:r>
+            <a:endParaRPr lang="en-US" dirty="0"/>
+          </a:p>
+        </p:txBody>
+      </p:sp>
+      <p:sp>
+        <p:nvSpPr>
+          <p:cNvPr id="4" name="Slide Number Placeholder 3"/>
+          <p:cNvSpPr>
+            <a:spLocks noGrp="1"/>
+          </p:cNvSpPr>
+          <p:nvPr>
+            <p:ph type="sldNum" sz="quarter" idx="10"/>
+          </p:nvPr>
+        </p:nvSpPr>
+        <p:spPr/>
+        <p:txBody>
+          <a:bodyPr/>
+          <a:lstStyle/>
+          <a:p>
+            <a:fld id="{A324EC77-1E53-42B7-AFE1-8E594C8CCE79}" type="slidenum">
+              <a:rPr lang="en-US" smtClean="0"/>
+              <a:t>6</a:t>
+            </a:fld>
+            <a:endParaRPr lang="en-US"/>
+          </a:p>
+        </p:txBody>
+      </p:sp>
+    </p:spTree>
+    <p:extLst>
+      <p:ext uri="{BB962C8B-B14F-4D97-AF65-F5344CB8AC3E}">
+        <p14:creationId xmlns:p14="http://schemas.microsoft.com/office/powerpoint/2010/main" val="191736360"/>
+      </p:ext>
+    </p:extLst>
+  </p:cSld>
+  <p:clrMapOvr>
+    <a:masterClrMapping/>
+  </p:clrMapOvr>
+</p:notes>
 </file>
 
 <file path=ppt/slideLayouts/slideLayout1.xml><?xml version="1.0" encoding="utf-8"?>
@@ -299,7 +1260,7 @@
           <a:p>
             <a:fld id="{0CBD4193-2F3E-4C7E-B9B9-89CD1B2B7A80}" type="datetimeFigureOut">
               <a:rPr lang="en-US" smtClean="0"/>
-              <a:t>2/11/2016</a:t>
+              <a:t>2/13/2016</a:t>
             </a:fld>
             <a:endParaRPr lang="en-US"/>
           </a:p>
@@ -469,7 +1430,7 @@
           <a:p>
             <a:fld id="{0CBD4193-2F3E-4C7E-B9B9-89CD1B2B7A80}" type="datetimeFigureOut">
               <a:rPr lang="en-US" smtClean="0"/>
-              <a:t>2/11/2016</a:t>
+              <a:t>2/13/2016</a:t>
             </a:fld>
             <a:endParaRPr lang="en-US"/>
           </a:p>
@@ -649,7 +1610,7 @@
           <a:p>
             <a:fld id="{0CBD4193-2F3E-4C7E-B9B9-89CD1B2B7A80}" type="datetimeFigureOut">
               <a:rPr lang="en-US" smtClean="0"/>
-              <a:t>2/11/2016</a:t>
+              <a:t>2/13/2016</a:t>
             </a:fld>
             <a:endParaRPr lang="en-US"/>
           </a:p>
@@ -819,7 +1780,7 @@
           <a:p>
             <a:fld id="{0CBD4193-2F3E-4C7E-B9B9-89CD1B2B7A80}" type="datetimeFigureOut">
               <a:rPr lang="en-US" smtClean="0"/>
-              <a:t>2/11/2016</a:t>
+              <a:t>2/13/2016</a:t>
             </a:fld>
             <a:endParaRPr lang="en-US"/>
           </a:p>
@@ -1065,7 +2026,7 @@
           <a:p>
             <a:fld id="{0CBD4193-2F3E-4C7E-B9B9-89CD1B2B7A80}" type="datetimeFigureOut">
               <a:rPr lang="en-US" smtClean="0"/>
-              <a:t>2/11/2016</a:t>
+              <a:t>2/13/2016</a:t>
             </a:fld>
             <a:endParaRPr lang="en-US"/>
           </a:p>
@@ -1353,7 +2314,7 @@
           <a:p>
             <a:fld id="{0CBD4193-2F3E-4C7E-B9B9-89CD1B2B7A80}" type="datetimeFigureOut">
               <a:rPr lang="en-US" smtClean="0"/>
-              <a:t>2/11/2016</a:t>
+              <a:t>2/13/2016</a:t>
             </a:fld>
             <a:endParaRPr lang="en-US"/>
           </a:p>
@@ -1775,7 +2736,7 @@
           <a:p>
             <a:fld id="{0CBD4193-2F3E-4C7E-B9B9-89CD1B2B7A80}" type="datetimeFigureOut">
               <a:rPr lang="en-US" smtClean="0"/>
-              <a:t>2/11/2016</a:t>
+              <a:t>2/13/2016</a:t>
             </a:fld>
             <a:endParaRPr lang="en-US"/>
           </a:p>
@@ -1893,7 +2854,7 @@
           <a:p>
             <a:fld id="{0CBD4193-2F3E-4C7E-B9B9-89CD1B2B7A80}" type="datetimeFigureOut">
               <a:rPr lang="en-US" smtClean="0"/>
-              <a:t>2/11/2016</a:t>
+              <a:t>2/13/2016</a:t>
             </a:fld>
             <a:endParaRPr lang="en-US"/>
           </a:p>
@@ -1988,7 +2949,7 @@
           <a:p>
             <a:fld id="{0CBD4193-2F3E-4C7E-B9B9-89CD1B2B7A80}" type="datetimeFigureOut">
               <a:rPr lang="en-US" smtClean="0"/>
-              <a:t>2/11/2016</a:t>
+              <a:t>2/13/2016</a:t>
             </a:fld>
             <a:endParaRPr lang="en-US"/>
           </a:p>
@@ -2265,7 +3226,7 @@
           <a:p>
             <a:fld id="{0CBD4193-2F3E-4C7E-B9B9-89CD1B2B7A80}" type="datetimeFigureOut">
               <a:rPr lang="en-US" smtClean="0"/>
-              <a:t>2/11/2016</a:t>
+              <a:t>2/13/2016</a:t>
             </a:fld>
             <a:endParaRPr lang="en-US"/>
           </a:p>
@@ -2518,7 +3479,7 @@
           <a:p>
             <a:fld id="{0CBD4193-2F3E-4C7E-B9B9-89CD1B2B7A80}" type="datetimeFigureOut">
               <a:rPr lang="en-US" smtClean="0"/>
-              <a:t>2/11/2016</a:t>
+              <a:t>2/13/2016</a:t>
             </a:fld>
             <a:endParaRPr lang="en-US"/>
           </a:p>
@@ -2731,7 +3692,7 @@
           <a:p>
             <a:fld id="{0CBD4193-2F3E-4C7E-B9B9-89CD1B2B7A80}" type="datetimeFigureOut">
               <a:rPr lang="en-US" smtClean="0"/>
-              <a:t>2/11/2016</a:t>
+              <a:t>2/13/2016</a:t>
             </a:fld>
             <a:endParaRPr lang="en-US"/>
           </a:p>
@@ -3227,6 +4188,39 @@
           </a:p>
         </p:txBody>
       </p:sp>
+      <p:pic>
+        <p:nvPicPr>
+          <p:cNvPr id="4" name="Audio 3">
+            <a:hlinkClick r:id="" action="ppaction://media"/>
+          </p:cNvPr>
+          <p:cNvPicPr>
+            <a:picLocks noChangeAspect="1"/>
+          </p:cNvPicPr>
+          <p:nvPr>
+            <a:audioFile r:link="rId2"/>
+            <p:extLst>
+              <p:ext uri="{DAA4B4D4-6D71-4841-9C94-3DE7FCFB9230}">
+                <p14:media xmlns:p14="http://schemas.microsoft.com/office/powerpoint/2010/main" r:embed="rId1"/>
+              </p:ext>
+            </p:extLst>
+          </p:nvPr>
+        </p:nvPicPr>
+        <p:blipFill>
+          <a:blip r:embed="rId5"/>
+          <a:stretch>
+            <a:fillRect/>
+          </a:stretch>
+        </p:blipFill>
+        <p:spPr>
+          <a:xfrm>
+            <a:off x="9296400" y="5257800"/>
+            <a:ext cx="609600" cy="609600"/>
+          </a:xfrm>
+          <a:prstGeom prst="rect">
+            <a:avLst/>
+          </a:prstGeom>
+        </p:spPr>
+      </p:pic>
     </p:spTree>
     <p:extLst>
       <p:ext uri="{BB962C8B-B14F-4D97-AF65-F5344CB8AC3E}">
@@ -3237,222 +4231,101 @@
   <p:clrMapOvr>
     <a:masterClrMapping/>
   </p:clrMapOvr>
-</p:sld>
-</file>
-
-<file path=ppt/slides/slide10.xml><?xml version="1.0" encoding="utf-8"?>
-<p:sld xmlns:a="http://schemas.openxmlformats.org/drawingml/2006/main" xmlns:r="http://schemas.openxmlformats.org/officeDocument/2006/relationships" xmlns:p="http://schemas.openxmlformats.org/presentationml/2006/main">
-  <p:cSld>
-    <p:spTree>
-      <p:nvGrpSpPr>
-        <p:cNvPr id="1" name=""/>
-        <p:cNvGrpSpPr/>
-        <p:nvPr/>
-      </p:nvGrpSpPr>
-      <p:grpSpPr>
-        <a:xfrm>
-          <a:off x="0" y="0"/>
-          <a:ext cx="0" cy="0"/>
-          <a:chOff x="0" y="0"/>
-          <a:chExt cx="0" cy="0"/>
-        </a:xfrm>
-      </p:grpSpPr>
-      <p:sp>
-        <p:nvSpPr>
-          <p:cNvPr id="2" name="Title 1"/>
-          <p:cNvSpPr>
-            <a:spLocks noGrp="1"/>
-          </p:cNvSpPr>
-          <p:nvPr>
-            <p:ph type="title"/>
-          </p:nvPr>
-        </p:nvSpPr>
-        <p:spPr/>
-        <p:txBody>
-          <a:bodyPr/>
-          <a:lstStyle/>
-          <a:p>
-            <a:r>
-              <a:rPr lang="en-US" dirty="0" smtClean="0"/>
-              <a:t>Milestones</a:t>
-            </a:r>
-            <a:endParaRPr lang="en-US" dirty="0"/>
-          </a:p>
-        </p:txBody>
-      </p:sp>
-      <p:sp>
-        <p:nvSpPr>
-          <p:cNvPr id="3" name="Content Placeholder 2"/>
-          <p:cNvSpPr>
-            <a:spLocks noGrp="1"/>
-          </p:cNvSpPr>
-          <p:nvPr>
-            <p:ph idx="1"/>
-          </p:nvPr>
-        </p:nvSpPr>
-        <p:spPr/>
-        <p:txBody>
-          <a:bodyPr/>
-          <a:lstStyle/>
-          <a:p>
-            <a:endParaRPr lang="en-US"/>
-          </a:p>
-        </p:txBody>
-      </p:sp>
-    </p:spTree>
-    <p:extLst>
-      <p:ext uri="{BB962C8B-B14F-4D97-AF65-F5344CB8AC3E}">
-        <p14:creationId xmlns:p14="http://schemas.microsoft.com/office/powerpoint/2010/main" val="1953379887"/>
-      </p:ext>
-    </p:extLst>
-  </p:cSld>
-  <p:clrMapOvr>
-    <a:masterClrMapping/>
-  </p:clrMapOvr>
-</p:sld>
-</file>
-
-<file path=ppt/slides/slide11.xml><?xml version="1.0" encoding="utf-8"?>
-<p:sld xmlns:a="http://schemas.openxmlformats.org/drawingml/2006/main" xmlns:r="http://schemas.openxmlformats.org/officeDocument/2006/relationships" xmlns:p="http://schemas.openxmlformats.org/presentationml/2006/main">
-  <p:cSld>
-    <p:spTree>
-      <p:nvGrpSpPr>
-        <p:cNvPr id="1" name=""/>
-        <p:cNvGrpSpPr/>
-        <p:nvPr/>
-      </p:nvGrpSpPr>
-      <p:grpSpPr>
-        <a:xfrm>
-          <a:off x="0" y="0"/>
-          <a:ext cx="0" cy="0"/>
-          <a:chOff x="0" y="0"/>
-          <a:chExt cx="0" cy="0"/>
-        </a:xfrm>
-      </p:grpSpPr>
-      <p:sp>
-        <p:nvSpPr>
-          <p:cNvPr id="2" name="Title 1"/>
-          <p:cNvSpPr>
-            <a:spLocks noGrp="1"/>
-          </p:cNvSpPr>
-          <p:nvPr>
-            <p:ph type="title"/>
-          </p:nvPr>
-        </p:nvSpPr>
-        <p:spPr/>
-        <p:txBody>
-          <a:bodyPr/>
-          <a:lstStyle/>
-          <a:p>
-            <a:r>
-              <a:rPr lang="en-US" dirty="0" smtClean="0"/>
-              <a:t>Gantt Chart</a:t>
-            </a:r>
-            <a:endParaRPr lang="en-US" dirty="0"/>
-          </a:p>
-        </p:txBody>
-      </p:sp>
-      <p:sp>
-        <p:nvSpPr>
-          <p:cNvPr id="3" name="Content Placeholder 2"/>
-          <p:cNvSpPr>
-            <a:spLocks noGrp="1"/>
-          </p:cNvSpPr>
-          <p:nvPr>
-            <p:ph idx="1"/>
-          </p:nvPr>
-        </p:nvSpPr>
-        <p:spPr/>
-        <p:txBody>
-          <a:bodyPr/>
-          <a:lstStyle/>
-          <a:p>
-            <a:endParaRPr lang="en-US"/>
-          </a:p>
-        </p:txBody>
-      </p:sp>
-    </p:spTree>
-    <p:extLst>
-      <p:ext uri="{BB962C8B-B14F-4D97-AF65-F5344CB8AC3E}">
-        <p14:creationId xmlns:p14="http://schemas.microsoft.com/office/powerpoint/2010/main" val="1953379887"/>
-      </p:ext>
-    </p:extLst>
-  </p:cSld>
-  <p:clrMapOvr>
-    <a:masterClrMapping/>
-  </p:clrMapOvr>
-</p:sld>
-</file>
-
-<file path=ppt/slides/slide12.xml><?xml version="1.0" encoding="utf-8"?>
-<p:sld xmlns:a="http://schemas.openxmlformats.org/drawingml/2006/main" xmlns:r="http://schemas.openxmlformats.org/officeDocument/2006/relationships" xmlns:p="http://schemas.openxmlformats.org/presentationml/2006/main">
-  <p:cSld>
-    <p:spTree>
-      <p:nvGrpSpPr>
-        <p:cNvPr id="1" name=""/>
-        <p:cNvGrpSpPr/>
-        <p:nvPr/>
-      </p:nvGrpSpPr>
-      <p:grpSpPr>
-        <a:xfrm>
-          <a:off x="0" y="0"/>
-          <a:ext cx="0" cy="0"/>
-          <a:chOff x="0" y="0"/>
-          <a:chExt cx="0" cy="0"/>
-        </a:xfrm>
-      </p:grpSpPr>
-      <p:sp>
-        <p:nvSpPr>
-          <p:cNvPr id="2" name="Title 1"/>
-          <p:cNvSpPr>
-            <a:spLocks noGrp="1"/>
-          </p:cNvSpPr>
-          <p:nvPr>
-            <p:ph type="title"/>
-          </p:nvPr>
-        </p:nvSpPr>
-        <p:spPr/>
-        <p:txBody>
-          <a:bodyPr/>
-          <a:lstStyle/>
-          <a:p>
-            <a:r>
-              <a:rPr lang="en-US" dirty="0" smtClean="0"/>
-              <a:t>Expected Deliverables</a:t>
-            </a:r>
-            <a:endParaRPr lang="en-US" dirty="0"/>
-          </a:p>
-        </p:txBody>
-      </p:sp>
-      <p:sp>
-        <p:nvSpPr>
-          <p:cNvPr id="3" name="Content Placeholder 2"/>
-          <p:cNvSpPr>
-            <a:spLocks noGrp="1"/>
-          </p:cNvSpPr>
-          <p:nvPr>
-            <p:ph idx="1"/>
-          </p:nvPr>
-        </p:nvSpPr>
-        <p:spPr/>
-        <p:txBody>
-          <a:bodyPr/>
-          <a:lstStyle/>
-          <a:p>
-            <a:endParaRPr lang="en-US" dirty="0"/>
-          </a:p>
-        </p:txBody>
-      </p:sp>
-    </p:spTree>
-    <p:extLst>
-      <p:ext uri="{BB962C8B-B14F-4D97-AF65-F5344CB8AC3E}">
-        <p14:creationId xmlns:p14="http://schemas.microsoft.com/office/powerpoint/2010/main" val="1953379887"/>
-      </p:ext>
-    </p:extLst>
-  </p:cSld>
-  <p:clrMapOvr>
-    <a:masterClrMapping/>
-  </p:clrMapOvr>
+  <mc:AlternateContent xmlns:mc="http://schemas.openxmlformats.org/markup-compatibility/2006" xmlns:p14="http://schemas.microsoft.com/office/powerpoint/2010/main">
+    <mc:Choice Requires="p14">
+      <p:transition spd="slow" p14:dur="2000" advTm="20271"/>
+    </mc:Choice>
+    <mc:Fallback xmlns="">
+      <p:transition spd="slow" advTm="20271"/>
+    </mc:Fallback>
+  </mc:AlternateContent>
+  <p:timing>
+    <p:tnLst>
+      <p:par>
+        <p:cTn id="1" dur="indefinite" restart="never" nodeType="tmRoot">
+          <p:childTnLst>
+            <p:seq concurrent="1" nextAc="seek">
+              <p:cTn id="2" dur="indefinite" nodeType="mainSeq">
+                <p:childTnLst>
+                  <p:par>
+                    <p:cTn id="3" fill="hold">
+                      <p:stCondLst>
+                        <p:cond delay="indefinite"/>
+                        <p:cond evt="onBegin" delay="0">
+                          <p:tn val="2"/>
+                        </p:cond>
+                      </p:stCondLst>
+                      <p:childTnLst>
+                        <p:par>
+                          <p:cTn id="4" fill="hold">
+                            <p:stCondLst>
+                              <p:cond delay="0"/>
+                            </p:stCondLst>
+                            <p:childTnLst>
+                              <p:par>
+                                <p:cTn id="5" presetID="1" presetClass="mediacall" presetSubtype="0" fill="hold" nodeType="afterEffect">
+                                  <p:stCondLst>
+                                    <p:cond delay="0"/>
+                                  </p:stCondLst>
+                                  <p:childTnLst>
+                                    <p:cmd type="call" cmd="playFrom(0.0)">
+                                      <p:cBhvr>
+                                        <p:cTn id="6" dur="1" fill="hold"/>
+                                        <p:tgtEl>
+                                          <p:spTgt spid="4"/>
+                                        </p:tgtEl>
+                                      </p:cBhvr>
+                                    </p:cmd>
+                                  </p:childTnLst>
+                                </p:cTn>
+                              </p:par>
+                            </p:childTnLst>
+                          </p:cTn>
+                        </p:par>
+                      </p:childTnLst>
+                    </p:cTn>
+                  </p:par>
+                </p:childTnLst>
+              </p:cTn>
+              <p:prevCondLst>
+                <p:cond evt="onPrev" delay="0">
+                  <p:tgtEl>
+                    <p:sldTgt/>
+                  </p:tgtEl>
+                </p:cond>
+              </p:prevCondLst>
+              <p:nextCondLst>
+                <p:cond evt="onNext" delay="0">
+                  <p:tgtEl>
+                    <p:sldTgt/>
+                  </p:tgtEl>
+                </p:cond>
+              </p:nextCondLst>
+            </p:seq>
+            <p:audio isNarration="1">
+              <p:cMediaNode vol="80000" showWhenStopped="0">
+                <p:cTn id="7" fill="hold" display="0">
+                  <p:stCondLst>
+                    <p:cond delay="indefinite"/>
+                  </p:stCondLst>
+                  <p:endCondLst>
+                    <p:cond evt="onStopAudio" delay="0">
+                      <p:tgtEl>
+                        <p:sldTgt/>
+                      </p:tgtEl>
+                    </p:cond>
+                  </p:endCondLst>
+                </p:cTn>
+                <p:tgtEl>
+                  <p:spTgt spid="4"/>
+                </p:tgtEl>
+              </p:cMediaNode>
+            </p:audio>
+          </p:childTnLst>
+        </p:cTn>
+      </p:par>
+    </p:tnLst>
+  </p:timing>
 </p:sld>
 </file>
 
@@ -3533,6 +4406,39 @@
           </a:p>
         </p:txBody>
       </p:sp>
+      <p:pic>
+        <p:nvPicPr>
+          <p:cNvPr id="4" name="Audio 3">
+            <a:hlinkClick r:id="" action="ppaction://media"/>
+          </p:cNvPr>
+          <p:cNvPicPr>
+            <a:picLocks noChangeAspect="1"/>
+          </p:cNvPicPr>
+          <p:nvPr>
+            <a:audioFile r:link="rId2"/>
+            <p:extLst>
+              <p:ext uri="{DAA4B4D4-6D71-4841-9C94-3DE7FCFB9230}">
+                <p14:media xmlns:p14="http://schemas.microsoft.com/office/powerpoint/2010/main" r:embed="rId1"/>
+              </p:ext>
+            </p:extLst>
+          </p:nvPr>
+        </p:nvPicPr>
+        <p:blipFill>
+          <a:blip r:embed="rId5"/>
+          <a:stretch>
+            <a:fillRect/>
+          </a:stretch>
+        </p:blipFill>
+        <p:spPr>
+          <a:xfrm>
+            <a:off x="9448800" y="5029200"/>
+            <a:ext cx="609600" cy="609600"/>
+          </a:xfrm>
+          <a:prstGeom prst="rect">
+            <a:avLst/>
+          </a:prstGeom>
+        </p:spPr>
+      </p:pic>
     </p:spTree>
     <p:extLst>
       <p:ext uri="{BB962C8B-B14F-4D97-AF65-F5344CB8AC3E}">
@@ -3543,6 +4449,101 @@
   <p:clrMapOvr>
     <a:masterClrMapping/>
   </p:clrMapOvr>
+  <mc:AlternateContent xmlns:mc="http://schemas.openxmlformats.org/markup-compatibility/2006" xmlns:p14="http://schemas.microsoft.com/office/powerpoint/2010/main">
+    <mc:Choice Requires="p14">
+      <p:transition spd="slow" p14:dur="2000" advTm="26452"/>
+    </mc:Choice>
+    <mc:Fallback xmlns="">
+      <p:transition spd="slow" advTm="26452"/>
+    </mc:Fallback>
+  </mc:AlternateContent>
+  <p:timing>
+    <p:tnLst>
+      <p:par>
+        <p:cTn id="1" dur="indefinite" restart="never" nodeType="tmRoot">
+          <p:childTnLst>
+            <p:seq concurrent="1" nextAc="seek">
+              <p:cTn id="2" dur="indefinite" nodeType="mainSeq">
+                <p:childTnLst>
+                  <p:par>
+                    <p:cTn id="3" fill="hold">
+                      <p:stCondLst>
+                        <p:cond delay="indefinite"/>
+                        <p:cond evt="onBegin" delay="0">
+                          <p:tn val="2"/>
+                        </p:cond>
+                      </p:stCondLst>
+                      <p:childTnLst>
+                        <p:par>
+                          <p:cTn id="4" fill="hold">
+                            <p:stCondLst>
+                              <p:cond delay="0"/>
+                            </p:stCondLst>
+                            <p:childTnLst>
+                              <p:par>
+                                <p:cTn id="5" presetID="1" presetClass="mediacall" presetSubtype="0" fill="hold" nodeType="afterEffect">
+                                  <p:stCondLst>
+                                    <p:cond delay="0"/>
+                                  </p:stCondLst>
+                                  <p:childTnLst>
+                                    <p:cmd type="call" cmd="playFrom(0.0)">
+                                      <p:cBhvr>
+                                        <p:cTn id="6" dur="1" fill="hold"/>
+                                        <p:tgtEl>
+                                          <p:spTgt spid="4"/>
+                                        </p:tgtEl>
+                                      </p:cBhvr>
+                                    </p:cmd>
+                                  </p:childTnLst>
+                                </p:cTn>
+                              </p:par>
+                            </p:childTnLst>
+                          </p:cTn>
+                        </p:par>
+                      </p:childTnLst>
+                    </p:cTn>
+                  </p:par>
+                </p:childTnLst>
+              </p:cTn>
+              <p:prevCondLst>
+                <p:cond evt="onPrev" delay="0">
+                  <p:tgtEl>
+                    <p:sldTgt/>
+                  </p:tgtEl>
+                </p:cond>
+              </p:prevCondLst>
+              <p:nextCondLst>
+                <p:cond evt="onNext" delay="0">
+                  <p:tgtEl>
+                    <p:sldTgt/>
+                  </p:tgtEl>
+                </p:cond>
+              </p:nextCondLst>
+            </p:seq>
+            <p:audio isNarration="1">
+              <p:cMediaNode vol="80000" showWhenStopped="0">
+                <p:cTn id="7" fill="hold" display="0">
+                  <p:stCondLst>
+                    <p:cond delay="indefinite"/>
+                  </p:stCondLst>
+                  <p:endCondLst>
+                    <p:cond evt="onStopAudio" delay="0">
+                      <p:tgtEl>
+                        <p:sldTgt/>
+                      </p:tgtEl>
+                    </p:cond>
+                  </p:endCondLst>
+                </p:cTn>
+                <p:tgtEl>
+                  <p:spTgt spid="4"/>
+                </p:tgtEl>
+              </p:cMediaNode>
+            </p:audio>
+          </p:childTnLst>
+        </p:cTn>
+      </p:par>
+    </p:tnLst>
+  </p:timing>
 </p:sld>
 </file>
 
@@ -3635,6 +4636,39 @@
           </a:p>
         </p:txBody>
       </p:sp>
+      <p:pic>
+        <p:nvPicPr>
+          <p:cNvPr id="9" name="Audio 8">
+            <a:hlinkClick r:id="" action="ppaction://media"/>
+          </p:cNvPr>
+          <p:cNvPicPr>
+            <a:picLocks noChangeAspect="1"/>
+          </p:cNvPicPr>
+          <p:nvPr>
+            <a:audioFile r:link="rId2"/>
+            <p:extLst>
+              <p:ext uri="{DAA4B4D4-6D71-4841-9C94-3DE7FCFB9230}">
+                <p14:media xmlns:p14="http://schemas.microsoft.com/office/powerpoint/2010/main" r:embed="rId1"/>
+              </p:ext>
+            </p:extLst>
+          </p:nvPr>
+        </p:nvPicPr>
+        <p:blipFill>
+          <a:blip r:embed="rId5"/>
+          <a:stretch>
+            <a:fillRect/>
+          </a:stretch>
+        </p:blipFill>
+        <p:spPr>
+          <a:xfrm>
+            <a:off x="10058400" y="6019800"/>
+            <a:ext cx="838200" cy="838200"/>
+          </a:xfrm>
+          <a:prstGeom prst="rect">
+            <a:avLst/>
+          </a:prstGeom>
+        </p:spPr>
+      </p:pic>
     </p:spTree>
     <p:extLst>
       <p:ext uri="{BB962C8B-B14F-4D97-AF65-F5344CB8AC3E}">
@@ -3645,6 +4679,101 @@
   <p:clrMapOvr>
     <a:masterClrMapping/>
   </p:clrMapOvr>
+  <mc:AlternateContent xmlns:mc="http://schemas.openxmlformats.org/markup-compatibility/2006">
+    <mc:Choice xmlns:p14="http://schemas.microsoft.com/office/powerpoint/2010/main" Requires="p14">
+      <p:transition spd="slow" p14:dur="2000" advTm="23236"/>
+    </mc:Choice>
+    <mc:Fallback>
+      <p:transition spd="slow" advTm="23236"/>
+    </mc:Fallback>
+  </mc:AlternateContent>
+  <p:timing>
+    <p:tnLst>
+      <p:par>
+        <p:cTn id="1" dur="indefinite" restart="never" nodeType="tmRoot">
+          <p:childTnLst>
+            <p:seq concurrent="1" nextAc="seek">
+              <p:cTn id="2" dur="indefinite" nodeType="mainSeq">
+                <p:childTnLst>
+                  <p:par>
+                    <p:cTn id="3" fill="hold">
+                      <p:stCondLst>
+                        <p:cond delay="indefinite"/>
+                        <p:cond evt="onBegin" delay="0">
+                          <p:tn val="2"/>
+                        </p:cond>
+                      </p:stCondLst>
+                      <p:childTnLst>
+                        <p:par>
+                          <p:cTn id="4" fill="hold">
+                            <p:stCondLst>
+                              <p:cond delay="0"/>
+                            </p:stCondLst>
+                            <p:childTnLst>
+                              <p:par>
+                                <p:cTn id="5" presetID="1" presetClass="mediacall" presetSubtype="0" fill="hold" nodeType="afterEffect">
+                                  <p:stCondLst>
+                                    <p:cond delay="0"/>
+                                  </p:stCondLst>
+                                  <p:childTnLst>
+                                    <p:cmd type="call" cmd="playFrom(0.0)">
+                                      <p:cBhvr>
+                                        <p:cTn id="6" dur="1" fill="hold"/>
+                                        <p:tgtEl>
+                                          <p:spTgt spid="9"/>
+                                        </p:tgtEl>
+                                      </p:cBhvr>
+                                    </p:cmd>
+                                  </p:childTnLst>
+                                </p:cTn>
+                              </p:par>
+                            </p:childTnLst>
+                          </p:cTn>
+                        </p:par>
+                      </p:childTnLst>
+                    </p:cTn>
+                  </p:par>
+                </p:childTnLst>
+              </p:cTn>
+              <p:prevCondLst>
+                <p:cond evt="onPrev" delay="0">
+                  <p:tgtEl>
+                    <p:sldTgt/>
+                  </p:tgtEl>
+                </p:cond>
+              </p:prevCondLst>
+              <p:nextCondLst>
+                <p:cond evt="onNext" delay="0">
+                  <p:tgtEl>
+                    <p:sldTgt/>
+                  </p:tgtEl>
+                </p:cond>
+              </p:nextCondLst>
+            </p:seq>
+            <p:audio isNarration="1">
+              <p:cMediaNode vol="80000" showWhenStopped="0">
+                <p:cTn id="7" fill="hold" display="0">
+                  <p:stCondLst>
+                    <p:cond delay="indefinite"/>
+                  </p:stCondLst>
+                  <p:endCondLst>
+                    <p:cond evt="onStopAudio" delay="0">
+                      <p:tgtEl>
+                        <p:sldTgt/>
+                      </p:tgtEl>
+                    </p:cond>
+                  </p:endCondLst>
+                </p:cTn>
+                <p:tgtEl>
+                  <p:spTgt spid="9"/>
+                </p:tgtEl>
+              </p:cMediaNode>
+            </p:audio>
+          </p:childTnLst>
+        </p:cTn>
+      </p:par>
+    </p:tnLst>
+  </p:timing>
 </p:sld>
 </file>
 
@@ -3687,7 +4816,7 @@
           <a:p>
             <a:r>
               <a:rPr lang="en-US" dirty="0" smtClean="0"/>
-              <a:t>The problem</a:t>
+              <a:t>The Business Case</a:t>
             </a:r>
             <a:endParaRPr lang="en-US" dirty="0"/>
           </a:p>
@@ -3737,6 +4866,39 @@
           </a:p>
         </p:txBody>
       </p:sp>
+      <p:pic>
+        <p:nvPicPr>
+          <p:cNvPr id="4" name="Audio 3">
+            <a:hlinkClick r:id="" action="ppaction://media"/>
+          </p:cNvPr>
+          <p:cNvPicPr>
+            <a:picLocks noChangeAspect="1"/>
+          </p:cNvPicPr>
+          <p:nvPr>
+            <a:audioFile r:link="rId2"/>
+            <p:extLst>
+              <p:ext uri="{DAA4B4D4-6D71-4841-9C94-3DE7FCFB9230}">
+                <p14:media xmlns:p14="http://schemas.microsoft.com/office/powerpoint/2010/main" r:embed="rId1"/>
+              </p:ext>
+            </p:extLst>
+          </p:nvPr>
+        </p:nvPicPr>
+        <p:blipFill>
+          <a:blip r:embed="rId5"/>
+          <a:stretch>
+            <a:fillRect/>
+          </a:stretch>
+        </p:blipFill>
+        <p:spPr>
+          <a:xfrm>
+            <a:off x="9372600" y="5791200"/>
+            <a:ext cx="609600" cy="609600"/>
+          </a:xfrm>
+          <a:prstGeom prst="rect">
+            <a:avLst/>
+          </a:prstGeom>
+        </p:spPr>
+      </p:pic>
     </p:spTree>
     <p:extLst>
       <p:ext uri="{BB962C8B-B14F-4D97-AF65-F5344CB8AC3E}">
@@ -3747,6 +4909,101 @@
   <p:clrMapOvr>
     <a:masterClrMapping/>
   </p:clrMapOvr>
+  <mc:AlternateContent xmlns:mc="http://schemas.openxmlformats.org/markup-compatibility/2006" xmlns:p14="http://schemas.microsoft.com/office/powerpoint/2010/main">
+    <mc:Choice Requires="p14">
+      <p:transition spd="slow" p14:dur="2000" advTm="33072"/>
+    </mc:Choice>
+    <mc:Fallback xmlns="">
+      <p:transition spd="slow" advTm="33072"/>
+    </mc:Fallback>
+  </mc:AlternateContent>
+  <p:timing>
+    <p:tnLst>
+      <p:par>
+        <p:cTn id="1" dur="indefinite" restart="never" nodeType="tmRoot">
+          <p:childTnLst>
+            <p:seq concurrent="1" nextAc="seek">
+              <p:cTn id="2" dur="indefinite" nodeType="mainSeq">
+                <p:childTnLst>
+                  <p:par>
+                    <p:cTn id="3" fill="hold">
+                      <p:stCondLst>
+                        <p:cond delay="indefinite"/>
+                        <p:cond evt="onBegin" delay="0">
+                          <p:tn val="2"/>
+                        </p:cond>
+                      </p:stCondLst>
+                      <p:childTnLst>
+                        <p:par>
+                          <p:cTn id="4" fill="hold">
+                            <p:stCondLst>
+                              <p:cond delay="0"/>
+                            </p:stCondLst>
+                            <p:childTnLst>
+                              <p:par>
+                                <p:cTn id="5" presetID="1" presetClass="mediacall" presetSubtype="0" fill="hold" nodeType="afterEffect">
+                                  <p:stCondLst>
+                                    <p:cond delay="0"/>
+                                  </p:stCondLst>
+                                  <p:childTnLst>
+                                    <p:cmd type="call" cmd="playFrom(0.0)">
+                                      <p:cBhvr>
+                                        <p:cTn id="6" dur="1" fill="hold"/>
+                                        <p:tgtEl>
+                                          <p:spTgt spid="4"/>
+                                        </p:tgtEl>
+                                      </p:cBhvr>
+                                    </p:cmd>
+                                  </p:childTnLst>
+                                </p:cTn>
+                              </p:par>
+                            </p:childTnLst>
+                          </p:cTn>
+                        </p:par>
+                      </p:childTnLst>
+                    </p:cTn>
+                  </p:par>
+                </p:childTnLst>
+              </p:cTn>
+              <p:prevCondLst>
+                <p:cond evt="onPrev" delay="0">
+                  <p:tgtEl>
+                    <p:sldTgt/>
+                  </p:tgtEl>
+                </p:cond>
+              </p:prevCondLst>
+              <p:nextCondLst>
+                <p:cond evt="onNext" delay="0">
+                  <p:tgtEl>
+                    <p:sldTgt/>
+                  </p:tgtEl>
+                </p:cond>
+              </p:nextCondLst>
+            </p:seq>
+            <p:audio isNarration="1">
+              <p:cMediaNode vol="80000" showWhenStopped="0">
+                <p:cTn id="7" fill="hold" display="0">
+                  <p:stCondLst>
+                    <p:cond delay="indefinite"/>
+                  </p:stCondLst>
+                  <p:endCondLst>
+                    <p:cond evt="onStopAudio" delay="0">
+                      <p:tgtEl>
+                        <p:sldTgt/>
+                      </p:tgtEl>
+                    </p:cond>
+                  </p:endCondLst>
+                </p:cTn>
+                <p:tgtEl>
+                  <p:spTgt spid="4"/>
+                </p:tgtEl>
+              </p:cMediaNode>
+            </p:audio>
+          </p:childTnLst>
+        </p:cTn>
+      </p:par>
+    </p:tnLst>
+  </p:timing>
 </p:sld>
 </file>
 
@@ -3789,7 +5046,7 @@
           <a:p>
             <a:r>
               <a:rPr lang="en-US" dirty="0" smtClean="0"/>
-              <a:t>The Solution</a:t>
+              <a:t>The Proposed Solution</a:t>
             </a:r>
             <a:endParaRPr lang="en-US" dirty="0"/>
           </a:p>
@@ -3841,6 +5098,39 @@
           </a:p>
         </p:txBody>
       </p:sp>
+      <p:pic>
+        <p:nvPicPr>
+          <p:cNvPr id="4" name="Audio 3">
+            <a:hlinkClick r:id="" action="ppaction://media"/>
+          </p:cNvPr>
+          <p:cNvPicPr>
+            <a:picLocks noChangeAspect="1"/>
+          </p:cNvPicPr>
+          <p:nvPr>
+            <a:audioFile r:link="rId2"/>
+            <p:extLst>
+              <p:ext uri="{DAA4B4D4-6D71-4841-9C94-3DE7FCFB9230}">
+                <p14:media xmlns:p14="http://schemas.microsoft.com/office/powerpoint/2010/main" r:embed="rId1"/>
+              </p:ext>
+            </p:extLst>
+          </p:nvPr>
+        </p:nvPicPr>
+        <p:blipFill>
+          <a:blip r:embed="rId5"/>
+          <a:stretch>
+            <a:fillRect/>
+          </a:stretch>
+        </p:blipFill>
+        <p:spPr>
+          <a:xfrm>
+            <a:off x="9448800" y="5257800"/>
+            <a:ext cx="609600" cy="609600"/>
+          </a:xfrm>
+          <a:prstGeom prst="rect">
+            <a:avLst/>
+          </a:prstGeom>
+        </p:spPr>
+      </p:pic>
     </p:spTree>
     <p:extLst>
       <p:ext uri="{BB962C8B-B14F-4D97-AF65-F5344CB8AC3E}">
@@ -3851,6 +5141,101 @@
   <p:clrMapOvr>
     <a:masterClrMapping/>
   </p:clrMapOvr>
+  <mc:AlternateContent xmlns:mc="http://schemas.openxmlformats.org/markup-compatibility/2006" xmlns:p14="http://schemas.microsoft.com/office/powerpoint/2010/main">
+    <mc:Choice Requires="p14">
+      <p:transition spd="slow" p14:dur="2000" advTm="22430"/>
+    </mc:Choice>
+    <mc:Fallback xmlns="">
+      <p:transition spd="slow" advTm="22430"/>
+    </mc:Fallback>
+  </mc:AlternateContent>
+  <p:timing>
+    <p:tnLst>
+      <p:par>
+        <p:cTn id="1" dur="indefinite" restart="never" nodeType="tmRoot">
+          <p:childTnLst>
+            <p:seq concurrent="1" nextAc="seek">
+              <p:cTn id="2" dur="indefinite" nodeType="mainSeq">
+                <p:childTnLst>
+                  <p:par>
+                    <p:cTn id="3" fill="hold">
+                      <p:stCondLst>
+                        <p:cond delay="indefinite"/>
+                        <p:cond evt="onBegin" delay="0">
+                          <p:tn val="2"/>
+                        </p:cond>
+                      </p:stCondLst>
+                      <p:childTnLst>
+                        <p:par>
+                          <p:cTn id="4" fill="hold">
+                            <p:stCondLst>
+                              <p:cond delay="0"/>
+                            </p:stCondLst>
+                            <p:childTnLst>
+                              <p:par>
+                                <p:cTn id="5" presetID="1" presetClass="mediacall" presetSubtype="0" fill="hold" nodeType="afterEffect">
+                                  <p:stCondLst>
+                                    <p:cond delay="0"/>
+                                  </p:stCondLst>
+                                  <p:childTnLst>
+                                    <p:cmd type="call" cmd="playFrom(0.0)">
+                                      <p:cBhvr>
+                                        <p:cTn id="6" dur="1" fill="hold"/>
+                                        <p:tgtEl>
+                                          <p:spTgt spid="4"/>
+                                        </p:tgtEl>
+                                      </p:cBhvr>
+                                    </p:cmd>
+                                  </p:childTnLst>
+                                </p:cTn>
+                              </p:par>
+                            </p:childTnLst>
+                          </p:cTn>
+                        </p:par>
+                      </p:childTnLst>
+                    </p:cTn>
+                  </p:par>
+                </p:childTnLst>
+              </p:cTn>
+              <p:prevCondLst>
+                <p:cond evt="onPrev" delay="0">
+                  <p:tgtEl>
+                    <p:sldTgt/>
+                  </p:tgtEl>
+                </p:cond>
+              </p:prevCondLst>
+              <p:nextCondLst>
+                <p:cond evt="onNext" delay="0">
+                  <p:tgtEl>
+                    <p:sldTgt/>
+                  </p:tgtEl>
+                </p:cond>
+              </p:nextCondLst>
+            </p:seq>
+            <p:audio isNarration="1">
+              <p:cMediaNode vol="80000" showWhenStopped="0">
+                <p:cTn id="7" fill="hold" display="0">
+                  <p:stCondLst>
+                    <p:cond delay="indefinite"/>
+                  </p:stCondLst>
+                  <p:endCondLst>
+                    <p:cond evt="onStopAudio" delay="0">
+                      <p:tgtEl>
+                        <p:sldTgt/>
+                      </p:tgtEl>
+                    </p:cond>
+                  </p:endCondLst>
+                </p:cTn>
+                <p:tgtEl>
+                  <p:spTgt spid="4"/>
+                </p:tgtEl>
+              </p:cMediaNode>
+            </p:audio>
+          </p:childTnLst>
+        </p:cTn>
+      </p:par>
+    </p:tnLst>
+  </p:timing>
 </p:sld>
 </file>
 
@@ -3893,7 +5278,7 @@
           <a:p>
             <a:r>
               <a:rPr lang="en-US" dirty="0" smtClean="0"/>
-              <a:t>The Solution – Part 2</a:t>
+              <a:t>The Results</a:t>
             </a:r>
             <a:endParaRPr lang="en-US" dirty="0"/>
           </a:p>
@@ -3921,35 +5306,19 @@
           <a:p>
             <a:r>
               <a:rPr lang="en-US" dirty="0" smtClean="0"/>
-              <a:t>In Massachusetts, risk scores are currently calculated using data available in the state’s All-Payer Claims Database (APCD)</a:t>
-            </a:r>
-          </a:p>
-          <a:p>
-            <a:pPr lvl="1"/>
+              <a:t>This tool will output a list of member IDs that have “missing diagnoses”</a:t>
+            </a:r>
+          </a:p>
+          <a:p>
             <a:r>
               <a:rPr lang="en-US" dirty="0" smtClean="0"/>
-              <a:t>The APCD contains data provided from health insurer claims systems. </a:t>
-            </a:r>
-          </a:p>
-          <a:p>
-            <a:pPr lvl="1"/>
+              <a:t>Missing diagnosis will be converted to a “missing risk score”, which will be an estimate of the financial impact of improving that member’s data quality.</a:t>
+            </a:r>
+          </a:p>
+          <a:p>
             <a:r>
               <a:rPr lang="en-US" dirty="0" smtClean="0"/>
-              <a:t>APCD data does not always match the data in EHRs.</a:t>
-            </a:r>
-          </a:p>
-          <a:p>
-            <a:pPr lvl="1"/>
-            <a:r>
-              <a:rPr lang="en-US" dirty="0" smtClean="0"/>
-              <a:t>Most insurer do not have the ability to compare APCD data to EHR data.</a:t>
-            </a:r>
-          </a:p>
-          <a:p>
-            <a:pPr lvl="1"/>
-            <a:r>
-              <a:rPr lang="en-US" dirty="0" smtClean="0"/>
-              <a:t>We will design a process to compare HCCs from the FHIR data to HCCs derived from APCD data.</a:t>
+              <a:t>Health insurers will use this data to identify patients requiring an annual physical, or medical records requiring a review by medical coding specialist.</a:t>
             </a:r>
           </a:p>
           <a:p>
@@ -3958,6 +5327,39 @@
           </a:p>
         </p:txBody>
       </p:sp>
+      <p:pic>
+        <p:nvPicPr>
+          <p:cNvPr id="5" name="Audio 4">
+            <a:hlinkClick r:id="" action="ppaction://media"/>
+          </p:cNvPr>
+          <p:cNvPicPr>
+            <a:picLocks noChangeAspect="1"/>
+          </p:cNvPicPr>
+          <p:nvPr>
+            <a:audioFile r:link="rId2"/>
+            <p:extLst>
+              <p:ext uri="{DAA4B4D4-6D71-4841-9C94-3DE7FCFB9230}">
+                <p14:media xmlns:p14="http://schemas.microsoft.com/office/powerpoint/2010/main" r:embed="rId1"/>
+              </p:ext>
+            </p:extLst>
+          </p:nvPr>
+        </p:nvPicPr>
+        <p:blipFill>
+          <a:blip r:embed="rId5"/>
+          <a:stretch>
+            <a:fillRect/>
+          </a:stretch>
+        </p:blipFill>
+        <p:spPr>
+          <a:xfrm>
+            <a:off x="9448800" y="6096000"/>
+            <a:ext cx="609600" cy="609600"/>
+          </a:xfrm>
+          <a:prstGeom prst="rect">
+            <a:avLst/>
+          </a:prstGeom>
+        </p:spPr>
+      </p:pic>
     </p:spTree>
     <p:extLst>
       <p:ext uri="{BB962C8B-B14F-4D97-AF65-F5344CB8AC3E}">
@@ -3968,6 +5370,101 @@
   <p:clrMapOvr>
     <a:masterClrMapping/>
   </p:clrMapOvr>
+  <mc:AlternateContent xmlns:mc="http://schemas.openxmlformats.org/markup-compatibility/2006">
+    <mc:Choice xmlns:p14="http://schemas.microsoft.com/office/powerpoint/2010/main" Requires="p14">
+      <p:transition spd="slow" p14:dur="2000" advTm="30829"/>
+    </mc:Choice>
+    <mc:Fallback>
+      <p:transition spd="slow" advTm="30829"/>
+    </mc:Fallback>
+  </mc:AlternateContent>
+  <p:timing>
+    <p:tnLst>
+      <p:par>
+        <p:cTn id="1" dur="indefinite" restart="never" nodeType="tmRoot">
+          <p:childTnLst>
+            <p:seq concurrent="1" nextAc="seek">
+              <p:cTn id="2" dur="indefinite" nodeType="mainSeq">
+                <p:childTnLst>
+                  <p:par>
+                    <p:cTn id="3" fill="hold">
+                      <p:stCondLst>
+                        <p:cond delay="indefinite"/>
+                        <p:cond evt="onBegin" delay="0">
+                          <p:tn val="2"/>
+                        </p:cond>
+                      </p:stCondLst>
+                      <p:childTnLst>
+                        <p:par>
+                          <p:cTn id="4" fill="hold">
+                            <p:stCondLst>
+                              <p:cond delay="0"/>
+                            </p:stCondLst>
+                            <p:childTnLst>
+                              <p:par>
+                                <p:cTn id="5" presetID="1" presetClass="mediacall" presetSubtype="0" fill="hold" nodeType="afterEffect">
+                                  <p:stCondLst>
+                                    <p:cond delay="0"/>
+                                  </p:stCondLst>
+                                  <p:childTnLst>
+                                    <p:cmd type="call" cmd="playFrom(0.0)">
+                                      <p:cBhvr>
+                                        <p:cTn id="6" dur="1" fill="hold"/>
+                                        <p:tgtEl>
+                                          <p:spTgt spid="5"/>
+                                        </p:tgtEl>
+                                      </p:cBhvr>
+                                    </p:cmd>
+                                  </p:childTnLst>
+                                </p:cTn>
+                              </p:par>
+                            </p:childTnLst>
+                          </p:cTn>
+                        </p:par>
+                      </p:childTnLst>
+                    </p:cTn>
+                  </p:par>
+                </p:childTnLst>
+              </p:cTn>
+              <p:prevCondLst>
+                <p:cond evt="onPrev" delay="0">
+                  <p:tgtEl>
+                    <p:sldTgt/>
+                  </p:tgtEl>
+                </p:cond>
+              </p:prevCondLst>
+              <p:nextCondLst>
+                <p:cond evt="onNext" delay="0">
+                  <p:tgtEl>
+                    <p:sldTgt/>
+                  </p:tgtEl>
+                </p:cond>
+              </p:nextCondLst>
+            </p:seq>
+            <p:audio isNarration="1">
+              <p:cMediaNode vol="80000" showWhenStopped="0">
+                <p:cTn id="7" fill="hold" display="0">
+                  <p:stCondLst>
+                    <p:cond delay="indefinite"/>
+                  </p:stCondLst>
+                  <p:endCondLst>
+                    <p:cond evt="onStopAudio" delay="0">
+                      <p:tgtEl>
+                        <p:sldTgt/>
+                      </p:tgtEl>
+                    </p:cond>
+                  </p:endCondLst>
+                </p:cTn>
+                <p:tgtEl>
+                  <p:spTgt spid="5"/>
+                </p:tgtEl>
+              </p:cMediaNode>
+            </p:audio>
+          </p:childTnLst>
+        </p:cTn>
+      </p:par>
+    </p:tnLst>
+  </p:timing>
 </p:sld>
 </file>
 
@@ -3998,33 +5495,10 @@
             <p:ph type="title"/>
           </p:nvPr>
         </p:nvSpPr>
-        <p:spPr/>
-        <p:txBody>
-          <a:bodyPr/>
-          <a:lstStyle/>
-          <a:p>
-            <a:r>
-              <a:rPr lang="en-US" dirty="0" smtClean="0"/>
-              <a:t>Team Member Key Responsibilities</a:t>
-            </a:r>
-            <a:endParaRPr lang="en-US" dirty="0"/>
-          </a:p>
-        </p:txBody>
-      </p:sp>
-      <p:sp>
-        <p:nvSpPr>
-          <p:cNvPr id="3" name="Content Placeholder 2"/>
-          <p:cNvSpPr>
-            <a:spLocks noGrp="1"/>
-          </p:cNvSpPr>
-          <p:nvPr>
-            <p:ph idx="1"/>
-          </p:nvPr>
-        </p:nvSpPr>
         <p:spPr>
           <a:xfrm>
-            <a:off x="457200" y="1600201"/>
-            <a:ext cx="8229600" cy="3962400"/>
+            <a:off x="533400" y="2514600"/>
+            <a:ext cx="8229600" cy="1143000"/>
           </a:xfrm>
         </p:spPr>
         <p:txBody>
@@ -4033,58 +5507,8 @@
           <a:p>
             <a:r>
               <a:rPr lang="en-US" dirty="0" smtClean="0"/>
-              <a:t>Augusto Burgos</a:t>
-            </a:r>
-          </a:p>
-          <a:p>
-            <a:r>
-              <a:rPr lang="en-US" dirty="0" smtClean="0"/>
-              <a:t>Spiro Ganas – Business Analyst</a:t>
-            </a:r>
-          </a:p>
-          <a:p>
-            <a:r>
-              <a:rPr lang="en-US" dirty="0" smtClean="0"/>
-              <a:t>Anja Guillory</a:t>
-            </a:r>
-          </a:p>
-          <a:p>
-            <a:r>
-              <a:rPr lang="en-US" dirty="0" smtClean="0"/>
-              <a:t>Jamie </a:t>
-            </a:r>
-            <a:r>
-              <a:rPr lang="en-US" dirty="0" err="1" smtClean="0"/>
-              <a:t>Richgels</a:t>
-            </a:r>
-            <a:endParaRPr lang="en-US" dirty="0" smtClean="0"/>
-          </a:p>
-          <a:p>
-            <a:r>
-              <a:rPr lang="en-US" dirty="0" smtClean="0"/>
-              <a:t>Daniel </a:t>
-            </a:r>
-            <a:r>
-              <a:rPr lang="en-US" dirty="0" err="1" smtClean="0"/>
-              <a:t>Stoneburner</a:t>
-            </a:r>
-            <a:endParaRPr lang="en-US" dirty="0" smtClean="0"/>
-          </a:p>
-          <a:p>
-            <a:r>
-              <a:rPr lang="en-US" dirty="0" smtClean="0"/>
-              <a:t>Tala </a:t>
-            </a:r>
-            <a:r>
-              <a:rPr lang="en-US" dirty="0" err="1" smtClean="0"/>
-              <a:t>Suidan</a:t>
-            </a:r>
-            <a:r>
-              <a:rPr lang="en-US" dirty="0" smtClean="0"/>
-              <a:t> – Project Manager</a:t>
-            </a:r>
-          </a:p>
-          <a:p>
+              <a:t>The End</a:t>
+            </a:r>
             <a:endParaRPr lang="en-US" dirty="0"/>
           </a:p>
         </p:txBody>
@@ -4092,181 +5516,7 @@
     </p:spTree>
     <p:extLst>
       <p:ext uri="{BB962C8B-B14F-4D97-AF65-F5344CB8AC3E}">
-        <p14:creationId xmlns:p14="http://schemas.microsoft.com/office/powerpoint/2010/main" val="1665300240"/>
-      </p:ext>
-    </p:extLst>
-  </p:cSld>
-  <p:clrMapOvr>
-    <a:masterClrMapping/>
-  </p:clrMapOvr>
-</p:sld>
-</file>
-
-<file path=ppt/slides/slide8.xml><?xml version="1.0" encoding="utf-8"?>
-<p:sld xmlns:a="http://schemas.openxmlformats.org/drawingml/2006/main" xmlns:r="http://schemas.openxmlformats.org/officeDocument/2006/relationships" xmlns:p="http://schemas.openxmlformats.org/presentationml/2006/main">
-  <p:cSld>
-    <p:spTree>
-      <p:nvGrpSpPr>
-        <p:cNvPr id="1" name=""/>
-        <p:cNvGrpSpPr/>
-        <p:nvPr/>
-      </p:nvGrpSpPr>
-      <p:grpSpPr>
-        <a:xfrm>
-          <a:off x="0" y="0"/>
-          <a:ext cx="0" cy="0"/>
-          <a:chOff x="0" y="0"/>
-          <a:chExt cx="0" cy="0"/>
-        </a:xfrm>
-      </p:grpSpPr>
-      <p:sp>
-        <p:nvSpPr>
-          <p:cNvPr id="2" name="Title 1"/>
-          <p:cNvSpPr>
-            <a:spLocks noGrp="1"/>
-          </p:cNvSpPr>
-          <p:nvPr>
-            <p:ph type="title"/>
-          </p:nvPr>
-        </p:nvSpPr>
-        <p:spPr/>
-        <p:txBody>
-          <a:bodyPr/>
-          <a:lstStyle/>
-          <a:p>
-            <a:r>
-              <a:rPr lang="en-US" dirty="0" smtClean="0"/>
-              <a:t>Tools Required</a:t>
-            </a:r>
-            <a:endParaRPr lang="en-US" dirty="0"/>
-          </a:p>
-        </p:txBody>
-      </p:sp>
-      <p:sp>
-        <p:nvSpPr>
-          <p:cNvPr id="3" name="Content Placeholder 2"/>
-          <p:cNvSpPr>
-            <a:spLocks noGrp="1"/>
-          </p:cNvSpPr>
-          <p:nvPr>
-            <p:ph idx="1"/>
-          </p:nvPr>
-        </p:nvSpPr>
-        <p:spPr/>
-        <p:txBody>
-          <a:bodyPr/>
-          <a:lstStyle/>
-          <a:p>
-            <a:endParaRPr lang="en-US" dirty="0"/>
-          </a:p>
-        </p:txBody>
-      </p:sp>
-    </p:spTree>
-    <p:extLst>
-      <p:ext uri="{BB962C8B-B14F-4D97-AF65-F5344CB8AC3E}">
-        <p14:creationId xmlns:p14="http://schemas.microsoft.com/office/powerpoint/2010/main" val="1665300240"/>
-      </p:ext>
-    </p:extLst>
-  </p:cSld>
-  <p:clrMapOvr>
-    <a:masterClrMapping/>
-  </p:clrMapOvr>
-</p:sld>
-</file>
-
-<file path=ppt/slides/slide9.xml><?xml version="1.0" encoding="utf-8"?>
-<p:sld xmlns:a="http://schemas.openxmlformats.org/drawingml/2006/main" xmlns:r="http://schemas.openxmlformats.org/officeDocument/2006/relationships" xmlns:p="http://schemas.openxmlformats.org/presentationml/2006/main">
-  <p:cSld>
-    <p:spTree>
-      <p:nvGrpSpPr>
-        <p:cNvPr id="1" name=""/>
-        <p:cNvGrpSpPr/>
-        <p:nvPr/>
-      </p:nvGrpSpPr>
-      <p:grpSpPr>
-        <a:xfrm>
-          <a:off x="0" y="0"/>
-          <a:ext cx="0" cy="0"/>
-          <a:chOff x="0" y="0"/>
-          <a:chExt cx="0" cy="0"/>
-        </a:xfrm>
-      </p:grpSpPr>
-      <p:sp>
-        <p:nvSpPr>
-          <p:cNvPr id="2" name="Title 1"/>
-          <p:cNvSpPr>
-            <a:spLocks noGrp="1"/>
-          </p:cNvSpPr>
-          <p:nvPr>
-            <p:ph type="title"/>
-          </p:nvPr>
-        </p:nvSpPr>
-        <p:spPr/>
-        <p:txBody>
-          <a:bodyPr/>
-          <a:lstStyle/>
-          <a:p>
-            <a:r>
-              <a:rPr lang="en-US" dirty="0" smtClean="0"/>
-              <a:t>External Resources Required</a:t>
-            </a:r>
-            <a:endParaRPr lang="en-US" dirty="0"/>
-          </a:p>
-        </p:txBody>
-      </p:sp>
-      <p:sp>
-        <p:nvSpPr>
-          <p:cNvPr id="3" name="Content Placeholder 2"/>
-          <p:cNvSpPr>
-            <a:spLocks noGrp="1"/>
-          </p:cNvSpPr>
-          <p:nvPr>
-            <p:ph idx="1"/>
-          </p:nvPr>
-        </p:nvSpPr>
-        <p:spPr/>
-        <p:txBody>
-          <a:bodyPr/>
-          <a:lstStyle/>
-          <a:p>
-            <a:r>
-              <a:rPr lang="en-US" dirty="0" err="1" smtClean="0"/>
-              <a:t>GaTech</a:t>
-            </a:r>
-            <a:r>
-              <a:rPr lang="en-US" dirty="0" smtClean="0"/>
-              <a:t> GitHub</a:t>
-            </a:r>
-          </a:p>
-          <a:p>
-            <a:r>
-              <a:rPr lang="en-US" dirty="0" err="1" smtClean="0"/>
-              <a:t>GaTech</a:t>
-            </a:r>
-            <a:r>
-              <a:rPr lang="en-US" dirty="0" smtClean="0"/>
-              <a:t> FHIR Server</a:t>
-            </a:r>
-          </a:p>
-          <a:p>
-            <a:r>
-              <a:rPr lang="en-US" dirty="0" smtClean="0"/>
-              <a:t>Massachusetts's APCD data dictionary</a:t>
-            </a:r>
-          </a:p>
-          <a:p>
-            <a:r>
-              <a:rPr lang="en-US" dirty="0" smtClean="0"/>
-              <a:t>A table mapping ICD9 codes to HCCs.</a:t>
-            </a:r>
-            <a:endParaRPr lang="en-US" dirty="0"/>
-          </a:p>
-        </p:txBody>
-      </p:sp>
-    </p:spTree>
-    <p:extLst>
-      <p:ext uri="{BB962C8B-B14F-4D97-AF65-F5344CB8AC3E}">
-        <p14:creationId xmlns:p14="http://schemas.microsoft.com/office/powerpoint/2010/main" val="1953379887"/>
+        <p14:creationId xmlns:p14="http://schemas.microsoft.com/office/powerpoint/2010/main" val="708926219"/>
       </p:ext>
     </p:extLst>
   </p:cSld>
@@ -4559,4 +5809,265 @@
   <a:objectDefaults/>
   <a:extraClrSchemeLst/>
 </a:theme>
+</file>
+
+<file path=ppt/theme/theme2.xml><?xml version="1.0" encoding="utf-8"?>
+<a:theme xmlns:a="http://schemas.openxmlformats.org/drawingml/2006/main" name="Office Theme">
+  <a:themeElements>
+    <a:clrScheme name="Office">
+      <a:dk1>
+        <a:sysClr val="windowText" lastClr="000000"/>
+      </a:dk1>
+      <a:lt1>
+        <a:sysClr val="window" lastClr="FFFFFF"/>
+      </a:lt1>
+      <a:dk2>
+        <a:srgbClr val="44546A"/>
+      </a:dk2>
+      <a:lt2>
+        <a:srgbClr val="E7E6E6"/>
+      </a:lt2>
+      <a:accent1>
+        <a:srgbClr val="5B9BD5"/>
+      </a:accent1>
+      <a:accent2>
+        <a:srgbClr val="ED7D31"/>
+      </a:accent2>
+      <a:accent3>
+        <a:srgbClr val="A5A5A5"/>
+      </a:accent3>
+      <a:accent4>
+        <a:srgbClr val="FFC000"/>
+      </a:accent4>
+      <a:accent5>
+        <a:srgbClr val="4472C4"/>
+      </a:accent5>
+      <a:accent6>
+        <a:srgbClr val="70AD47"/>
+      </a:accent6>
+      <a:hlink>
+        <a:srgbClr val="0563C1"/>
+      </a:hlink>
+      <a:folHlink>
+        <a:srgbClr val="954F72"/>
+      </a:folHlink>
+    </a:clrScheme>
+    <a:fontScheme name="Office">
+      <a:majorFont>
+        <a:latin typeface="Calibri Light" panose="020F0302020204030204"/>
+        <a:ea typeface=""/>
+        <a:cs typeface=""/>
+        <a:font script="Jpan" typeface="游ゴシック Light"/>
+        <a:font script="Hang" typeface="맑은 고딕"/>
+        <a:font script="Hans" typeface="等线 Light"/>
+        <a:font script="Hant" typeface="新細明體"/>
+        <a:font script="Arab" typeface="Times New Roman"/>
+        <a:font script="Hebr" typeface="Times New Roman"/>
+        <a:font script="Thai" typeface="Angsana New"/>
+        <a:font script="Ethi" typeface="Nyala"/>
+        <a:font script="Beng" typeface="Vrinda"/>
+        <a:font script="Gujr" typeface="Shruti"/>
+        <a:font script="Khmr" typeface="MoolBoran"/>
+        <a:font script="Knda" typeface="Tunga"/>
+        <a:font script="Guru" typeface="Raavi"/>
+        <a:font script="Cans" typeface="Euphemia"/>
+        <a:font script="Cher" typeface="Plantagenet Cherokee"/>
+        <a:font script="Yiii" typeface="Microsoft Yi Baiti"/>
+        <a:font script="Tibt" typeface="Microsoft Himalaya"/>
+        <a:font script="Thaa" typeface="MV Boli"/>
+        <a:font script="Deva" typeface="Mangal"/>
+        <a:font script="Telu" typeface="Gautami"/>
+        <a:font script="Taml" typeface="Latha"/>
+        <a:font script="Syrc" typeface="Estrangelo Edessa"/>
+        <a:font script="Orya" typeface="Kalinga"/>
+        <a:font script="Mlym" typeface="Kartika"/>
+        <a:font script="Laoo" typeface="DokChampa"/>
+        <a:font script="Sinh" typeface="Iskoola Pota"/>
+        <a:font script="Mong" typeface="Mongolian Baiti"/>
+        <a:font script="Viet" typeface="Times New Roman"/>
+        <a:font script="Uigh" typeface="Microsoft Uighur"/>
+        <a:font script="Geor" typeface="Sylfaen"/>
+      </a:majorFont>
+      <a:minorFont>
+        <a:latin typeface="Calibri" panose="020F0502020204030204"/>
+        <a:ea typeface=""/>
+        <a:cs typeface=""/>
+        <a:font script="Jpan" typeface="游ゴシック"/>
+        <a:font script="Hang" typeface="맑은 고딕"/>
+        <a:font script="Hans" typeface="等线"/>
+        <a:font script="Hant" typeface="新細明體"/>
+        <a:font script="Arab" typeface="Arial"/>
+        <a:font script="Hebr" typeface="Arial"/>
+        <a:font script="Thai" typeface="Cordia New"/>
+        <a:font script="Ethi" typeface="Nyala"/>
+        <a:font script="Beng" typeface="Vrinda"/>
+        <a:font script="Gujr" typeface="Shruti"/>
+        <a:font script="Khmr" typeface="DaunPenh"/>
+        <a:font script="Knda" typeface="Tunga"/>
+        <a:font script="Guru" typeface="Raavi"/>
+        <a:font script="Cans" typeface="Euphemia"/>
+        <a:font script="Cher" typeface="Plantagenet Cherokee"/>
+        <a:font script="Yiii" typeface="Microsoft Yi Baiti"/>
+        <a:font script="Tibt" typeface="Microsoft Himalaya"/>
+        <a:font script="Thaa" typeface="MV Boli"/>
+        <a:font script="Deva" typeface="Mangal"/>
+        <a:font script="Telu" typeface="Gautami"/>
+        <a:font script="Taml" typeface="Latha"/>
+        <a:font script="Syrc" typeface="Estrangelo Edessa"/>
+        <a:font script="Orya" typeface="Kalinga"/>
+        <a:font script="Mlym" typeface="Kartika"/>
+        <a:font script="Laoo" typeface="DokChampa"/>
+        <a:font script="Sinh" typeface="Iskoola Pota"/>
+        <a:font script="Mong" typeface="Mongolian Baiti"/>
+        <a:font script="Viet" typeface="Arial"/>
+        <a:font script="Uigh" typeface="Microsoft Uighur"/>
+        <a:font script="Geor" typeface="Sylfaen"/>
+      </a:minorFont>
+    </a:fontScheme>
+    <a:fmtScheme name="Office">
+      <a:fillStyleLst>
+        <a:solidFill>
+          <a:schemeClr val="phClr"/>
+        </a:solidFill>
+        <a:gradFill rotWithShape="1">
+          <a:gsLst>
+            <a:gs pos="0">
+              <a:schemeClr val="phClr">
+                <a:lumMod val="110000"/>
+                <a:satMod val="105000"/>
+                <a:tint val="67000"/>
+              </a:schemeClr>
+            </a:gs>
+            <a:gs pos="50000">
+              <a:schemeClr val="phClr">
+                <a:lumMod val="105000"/>
+                <a:satMod val="103000"/>
+                <a:tint val="73000"/>
+              </a:schemeClr>
+            </a:gs>
+            <a:gs pos="100000">
+              <a:schemeClr val="phClr">
+                <a:lumMod val="105000"/>
+                <a:satMod val="109000"/>
+                <a:tint val="81000"/>
+              </a:schemeClr>
+            </a:gs>
+          </a:gsLst>
+          <a:lin ang="5400000" scaled="0"/>
+        </a:gradFill>
+        <a:gradFill rotWithShape="1">
+          <a:gsLst>
+            <a:gs pos="0">
+              <a:schemeClr val="phClr">
+                <a:satMod val="103000"/>
+                <a:lumMod val="102000"/>
+                <a:tint val="94000"/>
+              </a:schemeClr>
+            </a:gs>
+            <a:gs pos="50000">
+              <a:schemeClr val="phClr">
+                <a:satMod val="110000"/>
+                <a:lumMod val="100000"/>
+                <a:shade val="100000"/>
+              </a:schemeClr>
+            </a:gs>
+            <a:gs pos="100000">
+              <a:schemeClr val="phClr">
+                <a:lumMod val="99000"/>
+                <a:satMod val="120000"/>
+                <a:shade val="78000"/>
+              </a:schemeClr>
+            </a:gs>
+          </a:gsLst>
+          <a:lin ang="5400000" scaled="0"/>
+        </a:gradFill>
+      </a:fillStyleLst>
+      <a:lnStyleLst>
+        <a:ln w="6350" cap="flat" cmpd="sng" algn="ctr">
+          <a:solidFill>
+            <a:schemeClr val="phClr"/>
+          </a:solidFill>
+          <a:prstDash val="solid"/>
+          <a:miter lim="800000"/>
+        </a:ln>
+        <a:ln w="12700" cap="flat" cmpd="sng" algn="ctr">
+          <a:solidFill>
+            <a:schemeClr val="phClr"/>
+          </a:solidFill>
+          <a:prstDash val="solid"/>
+          <a:miter lim="800000"/>
+        </a:ln>
+        <a:ln w="19050" cap="flat" cmpd="sng" algn="ctr">
+          <a:solidFill>
+            <a:schemeClr val="phClr"/>
+          </a:solidFill>
+          <a:prstDash val="solid"/>
+          <a:miter lim="800000"/>
+        </a:ln>
+      </a:lnStyleLst>
+      <a:effectStyleLst>
+        <a:effectStyle>
+          <a:effectLst/>
+        </a:effectStyle>
+        <a:effectStyle>
+          <a:effectLst/>
+        </a:effectStyle>
+        <a:effectStyle>
+          <a:effectLst>
+            <a:outerShdw blurRad="57150" dist="19050" dir="5400000" algn="ctr" rotWithShape="0">
+              <a:srgbClr val="000000">
+                <a:alpha val="63000"/>
+              </a:srgbClr>
+            </a:outerShdw>
+          </a:effectLst>
+        </a:effectStyle>
+      </a:effectStyleLst>
+      <a:bgFillStyleLst>
+        <a:solidFill>
+          <a:schemeClr val="phClr"/>
+        </a:solidFill>
+        <a:solidFill>
+          <a:schemeClr val="phClr">
+            <a:tint val="95000"/>
+            <a:satMod val="170000"/>
+          </a:schemeClr>
+        </a:solidFill>
+        <a:gradFill rotWithShape="1">
+          <a:gsLst>
+            <a:gs pos="0">
+              <a:schemeClr val="phClr">
+                <a:tint val="93000"/>
+                <a:satMod val="150000"/>
+                <a:shade val="98000"/>
+                <a:lumMod val="102000"/>
+              </a:schemeClr>
+            </a:gs>
+            <a:gs pos="50000">
+              <a:schemeClr val="phClr">
+                <a:tint val="98000"/>
+                <a:satMod val="130000"/>
+                <a:shade val="90000"/>
+                <a:lumMod val="103000"/>
+              </a:schemeClr>
+            </a:gs>
+            <a:gs pos="100000">
+              <a:schemeClr val="phClr">
+                <a:shade val="63000"/>
+                <a:satMod val="120000"/>
+              </a:schemeClr>
+            </a:gs>
+          </a:gsLst>
+          <a:lin ang="5400000" scaled="0"/>
+        </a:gradFill>
+      </a:bgFillStyleLst>
+    </a:fmtScheme>
+  </a:themeElements>
+  <a:objectDefaults/>
+  <a:extraClrSchemeLst/>
+  <a:extLst>
+    <a:ext uri="{05A4C25C-085E-4340-85A3-A5531E510DB2}">
+      <thm15:themeFamily xmlns:thm15="http://schemas.microsoft.com/office/thememl/2012/main" name="Office Theme" id="{62F939B6-93AF-4DB8-9C6B-D6C7DFDC589F}" vid="{4A3C46E8-61CC-4603-A589-7422A47A8E4A}"/>
+    </a:ext>
+  </a:extLst>
+</a:theme>
 </file>
</xml_diff>